<commit_message>
add microsoft in partners
</commit_message>
<xml_diff>
--- a/images/partners.pptx
+++ b/images/partners.pptx
@@ -104,6 +104,11 @@
       </a:defRPr>
     </a:lvl9pPr>
   </p:defaultTextStyle>
+  <p:extLst>
+    <p:ext uri="{EFAFB233-063F-42B5-8137-9DF3F51BA10A}">
+      <p15:sldGuideLst xmlns:p15="http://schemas.microsoft.com/office/powerpoint/2012/main"/>
+    </p:ext>
+  </p:extLst>
 </p:presentation>
 </file>
 
@@ -256,7 +261,7 @@
           <a:p>
             <a:fld id="{19F83783-D132-4BFA-A7A1-CBFDC422E47E}" type="datetimeFigureOut">
               <a:rPr lang="en-CH" smtClean="0"/>
-              <a:t>17.01.2025</a:t>
+              <a:t>14.02.2025</a:t>
             </a:fld>
             <a:endParaRPr lang="en-CH"/>
           </a:p>
@@ -456,7 +461,7 @@
           <a:p>
             <a:fld id="{19F83783-D132-4BFA-A7A1-CBFDC422E47E}" type="datetimeFigureOut">
               <a:rPr lang="en-CH" smtClean="0"/>
-              <a:t>17.01.2025</a:t>
+              <a:t>14.02.2025</a:t>
             </a:fld>
             <a:endParaRPr lang="en-CH"/>
           </a:p>
@@ -666,7 +671,7 @@
           <a:p>
             <a:fld id="{19F83783-D132-4BFA-A7A1-CBFDC422E47E}" type="datetimeFigureOut">
               <a:rPr lang="en-CH" smtClean="0"/>
-              <a:t>17.01.2025</a:t>
+              <a:t>14.02.2025</a:t>
             </a:fld>
             <a:endParaRPr lang="en-CH"/>
           </a:p>
@@ -866,7 +871,7 @@
           <a:p>
             <a:fld id="{19F83783-D132-4BFA-A7A1-CBFDC422E47E}" type="datetimeFigureOut">
               <a:rPr lang="en-CH" smtClean="0"/>
-              <a:t>17.01.2025</a:t>
+              <a:t>14.02.2025</a:t>
             </a:fld>
             <a:endParaRPr lang="en-CH"/>
           </a:p>
@@ -1142,7 +1147,7 @@
           <a:p>
             <a:fld id="{19F83783-D132-4BFA-A7A1-CBFDC422E47E}" type="datetimeFigureOut">
               <a:rPr lang="en-CH" smtClean="0"/>
-              <a:t>17.01.2025</a:t>
+              <a:t>14.02.2025</a:t>
             </a:fld>
             <a:endParaRPr lang="en-CH"/>
           </a:p>
@@ -1410,7 +1415,7 @@
           <a:p>
             <a:fld id="{19F83783-D132-4BFA-A7A1-CBFDC422E47E}" type="datetimeFigureOut">
               <a:rPr lang="en-CH" smtClean="0"/>
-              <a:t>17.01.2025</a:t>
+              <a:t>14.02.2025</a:t>
             </a:fld>
             <a:endParaRPr lang="en-CH"/>
           </a:p>
@@ -1825,7 +1830,7 @@
           <a:p>
             <a:fld id="{19F83783-D132-4BFA-A7A1-CBFDC422E47E}" type="datetimeFigureOut">
               <a:rPr lang="en-CH" smtClean="0"/>
-              <a:t>17.01.2025</a:t>
+              <a:t>14.02.2025</a:t>
             </a:fld>
             <a:endParaRPr lang="en-CH"/>
           </a:p>
@@ -1967,7 +1972,7 @@
           <a:p>
             <a:fld id="{19F83783-D132-4BFA-A7A1-CBFDC422E47E}" type="datetimeFigureOut">
               <a:rPr lang="en-CH" smtClean="0"/>
-              <a:t>17.01.2025</a:t>
+              <a:t>14.02.2025</a:t>
             </a:fld>
             <a:endParaRPr lang="en-CH"/>
           </a:p>
@@ -2080,7 +2085,7 @@
           <a:p>
             <a:fld id="{19F83783-D132-4BFA-A7A1-CBFDC422E47E}" type="datetimeFigureOut">
               <a:rPr lang="en-CH" smtClean="0"/>
-              <a:t>17.01.2025</a:t>
+              <a:t>14.02.2025</a:t>
             </a:fld>
             <a:endParaRPr lang="en-CH"/>
           </a:p>
@@ -2393,7 +2398,7 @@
           <a:p>
             <a:fld id="{19F83783-D132-4BFA-A7A1-CBFDC422E47E}" type="datetimeFigureOut">
               <a:rPr lang="en-CH" smtClean="0"/>
-              <a:t>17.01.2025</a:t>
+              <a:t>14.02.2025</a:t>
             </a:fld>
             <a:endParaRPr lang="en-CH"/>
           </a:p>
@@ -2682,7 +2687,7 @@
           <a:p>
             <a:fld id="{19F83783-D132-4BFA-A7A1-CBFDC422E47E}" type="datetimeFigureOut">
               <a:rPr lang="en-CH" smtClean="0"/>
-              <a:t>17.01.2025</a:t>
+              <a:t>14.02.2025</a:t>
             </a:fld>
             <a:endParaRPr lang="en-CH"/>
           </a:p>
@@ -2925,7 +2930,7 @@
           <a:p>
             <a:fld id="{19F83783-D132-4BFA-A7A1-CBFDC422E47E}" type="datetimeFigureOut">
               <a:rPr lang="en-CH" smtClean="0"/>
-              <a:t>17.01.2025</a:t>
+              <a:t>14.02.2025</a:t>
             </a:fld>
             <a:endParaRPr lang="en-CH"/>
           </a:p>
@@ -3344,10 +3349,10 @@
       </p:grpSpPr>
       <p:grpSp>
         <p:nvGrpSpPr>
-          <p:cNvPr id="18" name="Group 17">
-            <a:extLst>
-              <a:ext uri="{FF2B5EF4-FFF2-40B4-BE49-F238E27FC236}">
-                <a16:creationId xmlns:a16="http://schemas.microsoft.com/office/drawing/2014/main" id="{0DC94438-0D97-1BAB-69A0-6881E49B1883}"/>
+          <p:cNvPr id="4" name="Group 3">
+            <a:extLst>
+              <a:ext uri="{FF2B5EF4-FFF2-40B4-BE49-F238E27FC236}">
+                <a16:creationId xmlns:a16="http://schemas.microsoft.com/office/drawing/2014/main" id="{A61EC923-E8AC-5868-CFF2-4A055A003D93}"/>
               </a:ext>
             </a:extLst>
           </p:cNvPr>
@@ -3356,18 +3361,255 @@
         </p:nvGrpSpPr>
         <p:grpSpPr>
           <a:xfrm>
-            <a:off x="586966" y="1705179"/>
-            <a:ext cx="10947809" cy="3670707"/>
-            <a:chOff x="586966" y="1705179"/>
-            <a:chExt cx="10947809" cy="3670707"/>
+            <a:off x="622095" y="422479"/>
+            <a:ext cx="10947809" cy="5669039"/>
+            <a:chOff x="622095" y="422479"/>
+            <a:chExt cx="10947809" cy="5669039"/>
           </a:xfrm>
         </p:grpSpPr>
+        <p:grpSp>
+          <p:nvGrpSpPr>
+            <p:cNvPr id="18" name="Group 17">
+              <a:extLst>
+                <a:ext uri="{FF2B5EF4-FFF2-40B4-BE49-F238E27FC236}">
+                  <a16:creationId xmlns:a16="http://schemas.microsoft.com/office/drawing/2014/main" id="{0DC94438-0D97-1BAB-69A0-6881E49B1883}"/>
+                </a:ext>
+              </a:extLst>
+            </p:cNvPr>
+            <p:cNvGrpSpPr/>
+            <p:nvPr/>
+          </p:nvGrpSpPr>
+          <p:grpSpPr>
+            <a:xfrm>
+              <a:off x="622095" y="422479"/>
+              <a:ext cx="10947809" cy="3670707"/>
+              <a:chOff x="586966" y="1705179"/>
+              <a:chExt cx="10947809" cy="3670707"/>
+            </a:xfrm>
+          </p:grpSpPr>
+          <p:pic>
+            <p:nvPicPr>
+              <p:cNvPr id="6" name="Picture 5" descr="A black background with yellow letters and a black background&#10;&#10;Description automatically generated">
+                <a:extLst>
+                  <a:ext uri="{FF2B5EF4-FFF2-40B4-BE49-F238E27FC236}">
+                    <a16:creationId xmlns:a16="http://schemas.microsoft.com/office/drawing/2014/main" id="{ACCBA2E0-3184-E0E5-810D-0FB3DA40BAA6}"/>
+                  </a:ext>
+                </a:extLst>
+              </p:cNvPr>
+              <p:cNvPicPr>
+                <a:picLocks noChangeAspect="1"/>
+              </p:cNvPicPr>
+              <p:nvPr/>
+            </p:nvPicPr>
+            <p:blipFill>
+              <a:blip r:embed="rId2">
+                <a:extLst>
+                  <a:ext uri="{28A0092B-C50C-407E-A947-70E740481C1C}">
+                    <a14:useLocalDpi xmlns:a14="http://schemas.microsoft.com/office/drawing/2010/main" val="0"/>
+                  </a:ext>
+                </a:extLst>
+              </a:blip>
+              <a:stretch>
+                <a:fillRect/>
+              </a:stretch>
+            </p:blipFill>
+            <p:spPr>
+              <a:xfrm>
+                <a:off x="5532718" y="3701520"/>
+                <a:ext cx="1391011" cy="1674366"/>
+              </a:xfrm>
+              <a:prstGeom prst="rect">
+                <a:avLst/>
+              </a:prstGeom>
+            </p:spPr>
+          </p:pic>
+          <p:pic>
+            <p:nvPicPr>
+              <p:cNvPr id="7" name="Picture 6" descr="A black text on a white background&#10;&#10;Description automatically generated">
+                <a:extLst>
+                  <a:ext uri="{FF2B5EF4-FFF2-40B4-BE49-F238E27FC236}">
+                    <a16:creationId xmlns:a16="http://schemas.microsoft.com/office/drawing/2014/main" id="{A5673BB9-CF7F-645D-D853-167A94AA539E}"/>
+                  </a:ext>
+                </a:extLst>
+              </p:cNvPr>
+              <p:cNvPicPr>
+                <a:picLocks noChangeAspect="1"/>
+              </p:cNvPicPr>
+              <p:nvPr/>
+            </p:nvPicPr>
+            <p:blipFill>
+              <a:blip r:embed="rId3">
+                <a:extLst>
+                  <a:ext uri="{28A0092B-C50C-407E-A947-70E740481C1C}">
+                    <a14:useLocalDpi xmlns:a14="http://schemas.microsoft.com/office/drawing/2010/main" val="0"/>
+                  </a:ext>
+                </a:extLst>
+              </a:blip>
+              <a:stretch>
+                <a:fillRect/>
+              </a:stretch>
+            </p:blipFill>
+            <p:spPr>
+              <a:xfrm>
+                <a:off x="586966" y="2168274"/>
+                <a:ext cx="3217333" cy="497584"/>
+              </a:xfrm>
+              <a:prstGeom prst="rect">
+                <a:avLst/>
+              </a:prstGeom>
+            </p:spPr>
+          </p:pic>
+          <p:pic>
+            <p:nvPicPr>
+              <p:cNvPr id="8" name="Picture 7" descr="A black and red text&#10;&#10;Description automatically generated">
+                <a:extLst>
+                  <a:ext uri="{FF2B5EF4-FFF2-40B4-BE49-F238E27FC236}">
+                    <a16:creationId xmlns:a16="http://schemas.microsoft.com/office/drawing/2014/main" id="{F20BE04F-F0B4-D103-2FCF-6F3870D03774}"/>
+                  </a:ext>
+                </a:extLst>
+              </p:cNvPr>
+              <p:cNvPicPr>
+                <a:picLocks noChangeAspect="1"/>
+              </p:cNvPicPr>
+              <p:nvPr/>
+            </p:nvPicPr>
+            <p:blipFill>
+              <a:blip r:embed="rId4">
+                <a:extLst>
+                  <a:ext uri="{28A0092B-C50C-407E-A947-70E740481C1C}">
+                    <a14:useLocalDpi xmlns:a14="http://schemas.microsoft.com/office/drawing/2010/main" val="0"/>
+                  </a:ext>
+                </a:extLst>
+              </a:blip>
+              <a:stretch>
+                <a:fillRect/>
+              </a:stretch>
+            </p:blipFill>
+            <p:spPr>
+              <a:xfrm>
+                <a:off x="8614049" y="4179375"/>
+                <a:ext cx="2764057" cy="718656"/>
+              </a:xfrm>
+              <a:prstGeom prst="rect">
+                <a:avLst/>
+              </a:prstGeom>
+            </p:spPr>
+          </p:pic>
+          <p:pic>
+            <p:nvPicPr>
+              <p:cNvPr id="9" name="Picture 8" descr="Blue letters and a white background&#10;&#10;Description automatically generated">
+                <a:extLst>
+                  <a:ext uri="{FF2B5EF4-FFF2-40B4-BE49-F238E27FC236}">
+                    <a16:creationId xmlns:a16="http://schemas.microsoft.com/office/drawing/2014/main" id="{9BDA4390-F62B-E6E7-CCFE-D4F4B082172D}"/>
+                  </a:ext>
+                </a:extLst>
+              </p:cNvPr>
+              <p:cNvPicPr>
+                <a:picLocks noChangeAspect="1"/>
+              </p:cNvPicPr>
+              <p:nvPr/>
+            </p:nvPicPr>
+            <p:blipFill>
+              <a:blip r:embed="rId5">
+                <a:extLst>
+                  <a:ext uri="{28A0092B-C50C-407E-A947-70E740481C1C}">
+                    <a14:useLocalDpi xmlns:a14="http://schemas.microsoft.com/office/drawing/2010/main" val="0"/>
+                  </a:ext>
+                </a:extLst>
+              </a:blip>
+              <a:stretch>
+                <a:fillRect/>
+              </a:stretch>
+            </p:blipFill>
+            <p:spPr>
+              <a:xfrm>
+                <a:off x="8457381" y="1987860"/>
+                <a:ext cx="3077394" cy="1028362"/>
+              </a:xfrm>
+              <a:prstGeom prst="rect">
+                <a:avLst/>
+              </a:prstGeom>
+            </p:spPr>
+          </p:pic>
+          <p:pic>
+            <p:nvPicPr>
+              <p:cNvPr id="15" name="Picture 14" descr="A black screen with white text&#10;&#10;Description automatically generated">
+                <a:extLst>
+                  <a:ext uri="{FF2B5EF4-FFF2-40B4-BE49-F238E27FC236}">
+                    <a16:creationId xmlns:a16="http://schemas.microsoft.com/office/drawing/2014/main" id="{4C600F53-3502-5374-83B6-EC388363129D}"/>
+                  </a:ext>
+                </a:extLst>
+              </p:cNvPr>
+              <p:cNvPicPr>
+                <a:picLocks noChangeAspect="1"/>
+              </p:cNvPicPr>
+              <p:nvPr/>
+            </p:nvPicPr>
+            <p:blipFill>
+              <a:blip r:embed="rId6">
+                <a:extLst>
+                  <a:ext uri="{28A0092B-C50C-407E-A947-70E740481C1C}">
+                    <a14:useLocalDpi xmlns:a14="http://schemas.microsoft.com/office/drawing/2010/main" val="0"/>
+                  </a:ext>
+                </a:extLst>
+              </a:blip>
+              <a:stretch>
+                <a:fillRect/>
+              </a:stretch>
+            </p:blipFill>
+            <p:spPr>
+              <a:xfrm>
+                <a:off x="946799" y="3775686"/>
+                <a:ext cx="2857500" cy="1600200"/>
+              </a:xfrm>
+              <a:prstGeom prst="rect">
+                <a:avLst/>
+              </a:prstGeom>
+            </p:spPr>
+          </p:pic>
+          <p:pic>
+            <p:nvPicPr>
+              <p:cNvPr id="17" name="Picture 16" descr="A white rectangular sign with black text&#10;&#10;Description automatically generated">
+                <a:extLst>
+                  <a:ext uri="{FF2B5EF4-FFF2-40B4-BE49-F238E27FC236}">
+                    <a16:creationId xmlns:a16="http://schemas.microsoft.com/office/drawing/2014/main" id="{E1FFDC59-AFFC-B253-E20A-73B7E806BF8C}"/>
+                  </a:ext>
+                </a:extLst>
+              </p:cNvPr>
+              <p:cNvPicPr>
+                <a:picLocks noChangeAspect="1"/>
+              </p:cNvPicPr>
+              <p:nvPr/>
+            </p:nvPicPr>
+            <p:blipFill>
+              <a:blip r:embed="rId7">
+                <a:extLst>
+                  <a:ext uri="{28A0092B-C50C-407E-A947-70E740481C1C}">
+                    <a14:useLocalDpi xmlns:a14="http://schemas.microsoft.com/office/drawing/2010/main" val="0"/>
+                  </a:ext>
+                </a:extLst>
+              </a:blip>
+              <a:stretch>
+                <a:fillRect/>
+              </a:stretch>
+            </p:blipFill>
+            <p:spPr>
+              <a:xfrm>
+                <a:off x="4492540" y="1705179"/>
+                <a:ext cx="3276600" cy="1419206"/>
+              </a:xfrm>
+              <a:prstGeom prst="rect">
+                <a:avLst/>
+              </a:prstGeom>
+            </p:spPr>
+          </p:pic>
+        </p:grpSp>
         <p:pic>
           <p:nvPicPr>
-            <p:cNvPr id="6" name="Picture 5" descr="A black background with yellow letters and a black background&#10;&#10;Description automatically generated">
+            <p:cNvPr id="3" name="Picture 2" descr="A purple text on a black background&#10;&#10;AI-generated content may be incorrect.">
               <a:extLst>
                 <a:ext uri="{FF2B5EF4-FFF2-40B4-BE49-F238E27FC236}">
-                  <a16:creationId xmlns:a16="http://schemas.microsoft.com/office/drawing/2014/main" id="{ACCBA2E0-3184-E0E5-810D-0FB3DA40BAA6}"/>
+                  <a16:creationId xmlns:a16="http://schemas.microsoft.com/office/drawing/2014/main" id="{CEF673C4-2F89-19BA-5A72-3CA43319B9BA}"/>
                 </a:ext>
               </a:extLst>
             </p:cNvPr>
@@ -3377,7 +3619,7 @@
             <p:nvPr/>
           </p:nvPicPr>
           <p:blipFill>
-            <a:blip r:embed="rId2">
+            <a:blip r:embed="rId8">
               <a:extLst>
                 <a:ext uri="{28A0092B-C50C-407E-A947-70E740481C1C}">
                   <a14:useLocalDpi xmlns:a14="http://schemas.microsoft.com/office/drawing/2010/main" val="0"/>
@@ -3390,188 +3632,8 @@
           </p:blipFill>
           <p:spPr>
             <a:xfrm>
-              <a:off x="5532718" y="3701520"/>
-              <a:ext cx="1391011" cy="1674366"/>
-            </a:xfrm>
-            <a:prstGeom prst="rect">
-              <a:avLst/>
-            </a:prstGeom>
-          </p:spPr>
-        </p:pic>
-        <p:pic>
-          <p:nvPicPr>
-            <p:cNvPr id="7" name="Picture 6" descr="A black text on a white background&#10;&#10;Description automatically generated">
-              <a:extLst>
-                <a:ext uri="{FF2B5EF4-FFF2-40B4-BE49-F238E27FC236}">
-                  <a16:creationId xmlns:a16="http://schemas.microsoft.com/office/drawing/2014/main" id="{A5673BB9-CF7F-645D-D853-167A94AA539E}"/>
-                </a:ext>
-              </a:extLst>
-            </p:cNvPr>
-            <p:cNvPicPr>
-              <a:picLocks noChangeAspect="1"/>
-            </p:cNvPicPr>
-            <p:nvPr/>
-          </p:nvPicPr>
-          <p:blipFill>
-            <a:blip r:embed="rId3">
-              <a:extLst>
-                <a:ext uri="{28A0092B-C50C-407E-A947-70E740481C1C}">
-                  <a14:useLocalDpi xmlns:a14="http://schemas.microsoft.com/office/drawing/2010/main" val="0"/>
-                </a:ext>
-              </a:extLst>
-            </a:blip>
-            <a:stretch>
-              <a:fillRect/>
-            </a:stretch>
-          </p:blipFill>
-          <p:spPr>
-            <a:xfrm>
-              <a:off x="586966" y="2168274"/>
-              <a:ext cx="3217333" cy="497584"/>
-            </a:xfrm>
-            <a:prstGeom prst="rect">
-              <a:avLst/>
-            </a:prstGeom>
-          </p:spPr>
-        </p:pic>
-        <p:pic>
-          <p:nvPicPr>
-            <p:cNvPr id="8" name="Picture 7" descr="A black and red text&#10;&#10;Description automatically generated">
-              <a:extLst>
-                <a:ext uri="{FF2B5EF4-FFF2-40B4-BE49-F238E27FC236}">
-                  <a16:creationId xmlns:a16="http://schemas.microsoft.com/office/drawing/2014/main" id="{F20BE04F-F0B4-D103-2FCF-6F3870D03774}"/>
-                </a:ext>
-              </a:extLst>
-            </p:cNvPr>
-            <p:cNvPicPr>
-              <a:picLocks noChangeAspect="1"/>
-            </p:cNvPicPr>
-            <p:nvPr/>
-          </p:nvPicPr>
-          <p:blipFill>
-            <a:blip r:embed="rId4">
-              <a:extLst>
-                <a:ext uri="{28A0092B-C50C-407E-A947-70E740481C1C}">
-                  <a14:useLocalDpi xmlns:a14="http://schemas.microsoft.com/office/drawing/2010/main" val="0"/>
-                </a:ext>
-              </a:extLst>
-            </a:blip>
-            <a:stretch>
-              <a:fillRect/>
-            </a:stretch>
-          </p:blipFill>
-          <p:spPr>
-            <a:xfrm>
-              <a:off x="8614049" y="4179375"/>
-              <a:ext cx="2764057" cy="718656"/>
-            </a:xfrm>
-            <a:prstGeom prst="rect">
-              <a:avLst/>
-            </a:prstGeom>
-          </p:spPr>
-        </p:pic>
-        <p:pic>
-          <p:nvPicPr>
-            <p:cNvPr id="9" name="Picture 8" descr="Blue letters and a white background&#10;&#10;Description automatically generated">
-              <a:extLst>
-                <a:ext uri="{FF2B5EF4-FFF2-40B4-BE49-F238E27FC236}">
-                  <a16:creationId xmlns:a16="http://schemas.microsoft.com/office/drawing/2014/main" id="{9BDA4390-F62B-E6E7-CCFE-D4F4B082172D}"/>
-                </a:ext>
-              </a:extLst>
-            </p:cNvPr>
-            <p:cNvPicPr>
-              <a:picLocks noChangeAspect="1"/>
-            </p:cNvPicPr>
-            <p:nvPr/>
-          </p:nvPicPr>
-          <p:blipFill>
-            <a:blip r:embed="rId5">
-              <a:extLst>
-                <a:ext uri="{28A0092B-C50C-407E-A947-70E740481C1C}">
-                  <a14:useLocalDpi xmlns:a14="http://schemas.microsoft.com/office/drawing/2010/main" val="0"/>
-                </a:ext>
-              </a:extLst>
-            </a:blip>
-            <a:stretch>
-              <a:fillRect/>
-            </a:stretch>
-          </p:blipFill>
-          <p:spPr>
-            <a:xfrm>
-              <a:off x="8457381" y="1987860"/>
-              <a:ext cx="3077394" cy="1028362"/>
-            </a:xfrm>
-            <a:prstGeom prst="rect">
-              <a:avLst/>
-            </a:prstGeom>
-          </p:spPr>
-        </p:pic>
-        <p:pic>
-          <p:nvPicPr>
-            <p:cNvPr id="15" name="Picture 14" descr="A black screen with white text&#10;&#10;Description automatically generated">
-              <a:extLst>
-                <a:ext uri="{FF2B5EF4-FFF2-40B4-BE49-F238E27FC236}">
-                  <a16:creationId xmlns:a16="http://schemas.microsoft.com/office/drawing/2014/main" id="{4C600F53-3502-5374-83B6-EC388363129D}"/>
-                </a:ext>
-              </a:extLst>
-            </p:cNvPr>
-            <p:cNvPicPr>
-              <a:picLocks noChangeAspect="1"/>
-            </p:cNvPicPr>
-            <p:nvPr/>
-          </p:nvPicPr>
-          <p:blipFill>
-            <a:blip r:embed="rId6">
-              <a:extLst>
-                <a:ext uri="{28A0092B-C50C-407E-A947-70E740481C1C}">
-                  <a14:useLocalDpi xmlns:a14="http://schemas.microsoft.com/office/drawing/2010/main" val="0"/>
-                </a:ext>
-              </a:extLst>
-            </a:blip>
-            <a:stretch>
-              <a:fillRect/>
-            </a:stretch>
-          </p:blipFill>
-          <p:spPr>
-            <a:xfrm>
-              <a:off x="946799" y="3775686"/>
-              <a:ext cx="2857500" cy="1600200"/>
-            </a:xfrm>
-            <a:prstGeom prst="rect">
-              <a:avLst/>
-            </a:prstGeom>
-          </p:spPr>
-        </p:pic>
-        <p:pic>
-          <p:nvPicPr>
-            <p:cNvPr id="17" name="Picture 16" descr="A white rectangular sign with black text&#10;&#10;Description automatically generated">
-              <a:extLst>
-                <a:ext uri="{FF2B5EF4-FFF2-40B4-BE49-F238E27FC236}">
-                  <a16:creationId xmlns:a16="http://schemas.microsoft.com/office/drawing/2014/main" id="{E1FFDC59-AFFC-B253-E20A-73B7E806BF8C}"/>
-                </a:ext>
-              </a:extLst>
-            </p:cNvPr>
-            <p:cNvPicPr>
-              <a:picLocks noChangeAspect="1"/>
-            </p:cNvPicPr>
-            <p:nvPr/>
-          </p:nvPicPr>
-          <p:blipFill>
-            <a:blip r:embed="rId7">
-              <a:extLst>
-                <a:ext uri="{28A0092B-C50C-407E-A947-70E740481C1C}">
-                  <a14:useLocalDpi xmlns:a14="http://schemas.microsoft.com/office/drawing/2010/main" val="0"/>
-                </a:ext>
-              </a:extLst>
-            </a:blip>
-            <a:stretch>
-              <a:fillRect/>
-            </a:stretch>
-          </p:blipFill>
-          <p:spPr>
-            <a:xfrm>
-              <a:off x="4492540" y="1705179"/>
-              <a:ext cx="3276600" cy="1419206"/>
+              <a:off x="4339506" y="4600537"/>
+              <a:ext cx="3847692" cy="1490981"/>
             </a:xfrm>
             <a:prstGeom prst="rect">
               <a:avLst/>

</xml_diff>

<commit_message>
add futur of health grant in partner section
</commit_message>
<xml_diff>
--- a/images/partners.pptx
+++ b/images/partners.pptx
@@ -261,7 +261,7 @@
           <a:p>
             <a:fld id="{19F83783-D132-4BFA-A7A1-CBFDC422E47E}" type="datetimeFigureOut">
               <a:rPr lang="en-CH" smtClean="0"/>
-              <a:t>14.02.2025</a:t>
+              <a:t>03.03.2025</a:t>
             </a:fld>
             <a:endParaRPr lang="en-CH"/>
           </a:p>
@@ -461,7 +461,7 @@
           <a:p>
             <a:fld id="{19F83783-D132-4BFA-A7A1-CBFDC422E47E}" type="datetimeFigureOut">
               <a:rPr lang="en-CH" smtClean="0"/>
-              <a:t>14.02.2025</a:t>
+              <a:t>03.03.2025</a:t>
             </a:fld>
             <a:endParaRPr lang="en-CH"/>
           </a:p>
@@ -671,7 +671,7 @@
           <a:p>
             <a:fld id="{19F83783-D132-4BFA-A7A1-CBFDC422E47E}" type="datetimeFigureOut">
               <a:rPr lang="en-CH" smtClean="0"/>
-              <a:t>14.02.2025</a:t>
+              <a:t>03.03.2025</a:t>
             </a:fld>
             <a:endParaRPr lang="en-CH"/>
           </a:p>
@@ -871,7 +871,7 @@
           <a:p>
             <a:fld id="{19F83783-D132-4BFA-A7A1-CBFDC422E47E}" type="datetimeFigureOut">
               <a:rPr lang="en-CH" smtClean="0"/>
-              <a:t>14.02.2025</a:t>
+              <a:t>03.03.2025</a:t>
             </a:fld>
             <a:endParaRPr lang="en-CH"/>
           </a:p>
@@ -1147,7 +1147,7 @@
           <a:p>
             <a:fld id="{19F83783-D132-4BFA-A7A1-CBFDC422E47E}" type="datetimeFigureOut">
               <a:rPr lang="en-CH" smtClean="0"/>
-              <a:t>14.02.2025</a:t>
+              <a:t>03.03.2025</a:t>
             </a:fld>
             <a:endParaRPr lang="en-CH"/>
           </a:p>
@@ -1415,7 +1415,7 @@
           <a:p>
             <a:fld id="{19F83783-D132-4BFA-A7A1-CBFDC422E47E}" type="datetimeFigureOut">
               <a:rPr lang="en-CH" smtClean="0"/>
-              <a:t>14.02.2025</a:t>
+              <a:t>03.03.2025</a:t>
             </a:fld>
             <a:endParaRPr lang="en-CH"/>
           </a:p>
@@ -1830,7 +1830,7 @@
           <a:p>
             <a:fld id="{19F83783-D132-4BFA-A7A1-CBFDC422E47E}" type="datetimeFigureOut">
               <a:rPr lang="en-CH" smtClean="0"/>
-              <a:t>14.02.2025</a:t>
+              <a:t>03.03.2025</a:t>
             </a:fld>
             <a:endParaRPr lang="en-CH"/>
           </a:p>
@@ -1972,7 +1972,7 @@
           <a:p>
             <a:fld id="{19F83783-D132-4BFA-A7A1-CBFDC422E47E}" type="datetimeFigureOut">
               <a:rPr lang="en-CH" smtClean="0"/>
-              <a:t>14.02.2025</a:t>
+              <a:t>03.03.2025</a:t>
             </a:fld>
             <a:endParaRPr lang="en-CH"/>
           </a:p>
@@ -2085,7 +2085,7 @@
           <a:p>
             <a:fld id="{19F83783-D132-4BFA-A7A1-CBFDC422E47E}" type="datetimeFigureOut">
               <a:rPr lang="en-CH" smtClean="0"/>
-              <a:t>14.02.2025</a:t>
+              <a:t>03.03.2025</a:t>
             </a:fld>
             <a:endParaRPr lang="en-CH"/>
           </a:p>
@@ -2398,7 +2398,7 @@
           <a:p>
             <a:fld id="{19F83783-D132-4BFA-A7A1-CBFDC422E47E}" type="datetimeFigureOut">
               <a:rPr lang="en-CH" smtClean="0"/>
-              <a:t>14.02.2025</a:t>
+              <a:t>03.03.2025</a:t>
             </a:fld>
             <a:endParaRPr lang="en-CH"/>
           </a:p>
@@ -2687,7 +2687,7 @@
           <a:p>
             <a:fld id="{19F83783-D132-4BFA-A7A1-CBFDC422E47E}" type="datetimeFigureOut">
               <a:rPr lang="en-CH" smtClean="0"/>
-              <a:t>14.02.2025</a:t>
+              <a:t>03.03.2025</a:t>
             </a:fld>
             <a:endParaRPr lang="en-CH"/>
           </a:p>
@@ -2930,7 +2930,7 @@
           <a:p>
             <a:fld id="{19F83783-D132-4BFA-A7A1-CBFDC422E47E}" type="datetimeFigureOut">
               <a:rPr lang="en-CH" smtClean="0"/>
-              <a:t>14.02.2025</a:t>
+              <a:t>03.03.2025</a:t>
             </a:fld>
             <a:endParaRPr lang="en-CH"/>
           </a:p>
@@ -3349,10 +3349,10 @@
       </p:grpSpPr>
       <p:grpSp>
         <p:nvGrpSpPr>
-          <p:cNvPr id="4" name="Group 3">
-            <a:extLst>
-              <a:ext uri="{FF2B5EF4-FFF2-40B4-BE49-F238E27FC236}">
-                <a16:creationId xmlns:a16="http://schemas.microsoft.com/office/drawing/2014/main" id="{A61EC923-E8AC-5868-CFF2-4A055A003D93}"/>
+          <p:cNvPr id="10" name="Group 9">
+            <a:extLst>
+              <a:ext uri="{FF2B5EF4-FFF2-40B4-BE49-F238E27FC236}">
+                <a16:creationId xmlns:a16="http://schemas.microsoft.com/office/drawing/2014/main" id="{C0BFE695-35B8-A459-AA66-AC3260968574}"/>
               </a:ext>
             </a:extLst>
           </p:cNvPr>
@@ -3632,8 +3632,44 @@
           </p:blipFill>
           <p:spPr>
             <a:xfrm>
-              <a:off x="4339506" y="4600537"/>
+              <a:off x="5948850" y="4600537"/>
               <a:ext cx="3847692" cy="1490981"/>
+            </a:xfrm>
+            <a:prstGeom prst="rect">
+              <a:avLst/>
+            </a:prstGeom>
+          </p:spPr>
+        </p:pic>
+        <p:pic>
+          <p:nvPicPr>
+            <p:cNvPr id="5" name="Picture 4" descr="Blue text on a black background&#10;&#10;AI-generated content may be incorrect.">
+              <a:extLst>
+                <a:ext uri="{FF2B5EF4-FFF2-40B4-BE49-F238E27FC236}">
+                  <a16:creationId xmlns:a16="http://schemas.microsoft.com/office/drawing/2014/main" id="{3ADAA09A-0E12-3D9A-BE61-816CB16C56C7}"/>
+                </a:ext>
+              </a:extLst>
+            </p:cNvPr>
+            <p:cNvPicPr>
+              <a:picLocks noChangeAspect="1"/>
+            </p:cNvPicPr>
+            <p:nvPr/>
+          </p:nvPicPr>
+          <p:blipFill>
+            <a:blip r:embed="rId9">
+              <a:extLst>
+                <a:ext uri="{28A0092B-C50C-407E-A947-70E740481C1C}">
+                  <a14:useLocalDpi xmlns:a14="http://schemas.microsoft.com/office/drawing/2010/main" val="0"/>
+                </a:ext>
+              </a:extLst>
+            </a:blip>
+            <a:stretch>
+              <a:fillRect/>
+            </a:stretch>
+          </p:blipFill>
+          <p:spPr>
+            <a:xfrm>
+              <a:off x="2583658" y="4988722"/>
+              <a:ext cx="2872728" cy="714610"/>
             </a:xfrm>
             <a:prstGeom prst="rect">
               <a:avLst/>

</xml_diff>

<commit_message>
update partners image with venture winner logo
</commit_message>
<xml_diff>
--- a/images/partners.pptx
+++ b/images/partners.pptx
@@ -261,7 +261,7 @@
           <a:p>
             <a:fld id="{19F83783-D132-4BFA-A7A1-CBFDC422E47E}" type="datetimeFigureOut">
               <a:rPr lang="en-CH" smtClean="0"/>
-              <a:t>03.03.2025</a:t>
+              <a:t>03.07.2025</a:t>
             </a:fld>
             <a:endParaRPr lang="en-CH"/>
           </a:p>
@@ -461,7 +461,7 @@
           <a:p>
             <a:fld id="{19F83783-D132-4BFA-A7A1-CBFDC422E47E}" type="datetimeFigureOut">
               <a:rPr lang="en-CH" smtClean="0"/>
-              <a:t>03.03.2025</a:t>
+              <a:t>03.07.2025</a:t>
             </a:fld>
             <a:endParaRPr lang="en-CH"/>
           </a:p>
@@ -671,7 +671,7 @@
           <a:p>
             <a:fld id="{19F83783-D132-4BFA-A7A1-CBFDC422E47E}" type="datetimeFigureOut">
               <a:rPr lang="en-CH" smtClean="0"/>
-              <a:t>03.03.2025</a:t>
+              <a:t>03.07.2025</a:t>
             </a:fld>
             <a:endParaRPr lang="en-CH"/>
           </a:p>
@@ -871,7 +871,7 @@
           <a:p>
             <a:fld id="{19F83783-D132-4BFA-A7A1-CBFDC422E47E}" type="datetimeFigureOut">
               <a:rPr lang="en-CH" smtClean="0"/>
-              <a:t>03.03.2025</a:t>
+              <a:t>03.07.2025</a:t>
             </a:fld>
             <a:endParaRPr lang="en-CH"/>
           </a:p>
@@ -1147,7 +1147,7 @@
           <a:p>
             <a:fld id="{19F83783-D132-4BFA-A7A1-CBFDC422E47E}" type="datetimeFigureOut">
               <a:rPr lang="en-CH" smtClean="0"/>
-              <a:t>03.03.2025</a:t>
+              <a:t>03.07.2025</a:t>
             </a:fld>
             <a:endParaRPr lang="en-CH"/>
           </a:p>
@@ -1415,7 +1415,7 @@
           <a:p>
             <a:fld id="{19F83783-D132-4BFA-A7A1-CBFDC422E47E}" type="datetimeFigureOut">
               <a:rPr lang="en-CH" smtClean="0"/>
-              <a:t>03.03.2025</a:t>
+              <a:t>03.07.2025</a:t>
             </a:fld>
             <a:endParaRPr lang="en-CH"/>
           </a:p>
@@ -1830,7 +1830,7 @@
           <a:p>
             <a:fld id="{19F83783-D132-4BFA-A7A1-CBFDC422E47E}" type="datetimeFigureOut">
               <a:rPr lang="en-CH" smtClean="0"/>
-              <a:t>03.03.2025</a:t>
+              <a:t>03.07.2025</a:t>
             </a:fld>
             <a:endParaRPr lang="en-CH"/>
           </a:p>
@@ -1972,7 +1972,7 @@
           <a:p>
             <a:fld id="{19F83783-D132-4BFA-A7A1-CBFDC422E47E}" type="datetimeFigureOut">
               <a:rPr lang="en-CH" smtClean="0"/>
-              <a:t>03.03.2025</a:t>
+              <a:t>03.07.2025</a:t>
             </a:fld>
             <a:endParaRPr lang="en-CH"/>
           </a:p>
@@ -2085,7 +2085,7 @@
           <a:p>
             <a:fld id="{19F83783-D132-4BFA-A7A1-CBFDC422E47E}" type="datetimeFigureOut">
               <a:rPr lang="en-CH" smtClean="0"/>
-              <a:t>03.03.2025</a:t>
+              <a:t>03.07.2025</a:t>
             </a:fld>
             <a:endParaRPr lang="en-CH"/>
           </a:p>
@@ -2398,7 +2398,7 @@
           <a:p>
             <a:fld id="{19F83783-D132-4BFA-A7A1-CBFDC422E47E}" type="datetimeFigureOut">
               <a:rPr lang="en-CH" smtClean="0"/>
-              <a:t>03.03.2025</a:t>
+              <a:t>03.07.2025</a:t>
             </a:fld>
             <a:endParaRPr lang="en-CH"/>
           </a:p>
@@ -2687,7 +2687,7 @@
           <a:p>
             <a:fld id="{19F83783-D132-4BFA-A7A1-CBFDC422E47E}" type="datetimeFigureOut">
               <a:rPr lang="en-CH" smtClean="0"/>
-              <a:t>03.03.2025</a:t>
+              <a:t>03.07.2025</a:t>
             </a:fld>
             <a:endParaRPr lang="en-CH"/>
           </a:p>
@@ -2930,7 +2930,7 @@
           <a:p>
             <a:fld id="{19F83783-D132-4BFA-A7A1-CBFDC422E47E}" type="datetimeFigureOut">
               <a:rPr lang="en-CH" smtClean="0"/>
-              <a:t>03.03.2025</a:t>
+              <a:t>03.07.2025</a:t>
             </a:fld>
             <a:endParaRPr lang="en-CH"/>
           </a:p>
@@ -3349,10 +3349,10 @@
       </p:grpSpPr>
       <p:grpSp>
         <p:nvGrpSpPr>
-          <p:cNvPr id="10" name="Group 9">
-            <a:extLst>
-              <a:ext uri="{FF2B5EF4-FFF2-40B4-BE49-F238E27FC236}">
-                <a16:creationId xmlns:a16="http://schemas.microsoft.com/office/drawing/2014/main" id="{C0BFE695-35B8-A459-AA66-AC3260968574}"/>
+          <p:cNvPr id="18" name="Group 17">
+            <a:extLst>
+              <a:ext uri="{FF2B5EF4-FFF2-40B4-BE49-F238E27FC236}">
+                <a16:creationId xmlns:a16="http://schemas.microsoft.com/office/drawing/2014/main" id="{0DC94438-0D97-1BAB-69A0-6881E49B1883}"/>
               </a:ext>
             </a:extLst>
           </p:cNvPr>
@@ -3362,254 +3362,17 @@
         <p:grpSpPr>
           <a:xfrm>
             <a:off x="622095" y="422479"/>
-            <a:ext cx="10947809" cy="5669039"/>
-            <a:chOff x="622095" y="422479"/>
-            <a:chExt cx="10947809" cy="5669039"/>
+            <a:ext cx="10947809" cy="3670707"/>
+            <a:chOff x="586966" y="1705179"/>
+            <a:chExt cx="10947809" cy="3670707"/>
           </a:xfrm>
         </p:grpSpPr>
-        <p:grpSp>
-          <p:nvGrpSpPr>
-            <p:cNvPr id="18" name="Group 17">
+        <p:pic>
+          <p:nvPicPr>
+            <p:cNvPr id="6" name="Picture 5" descr="A black background with yellow letters and a black background&#10;&#10;Description automatically generated">
               <a:extLst>
                 <a:ext uri="{FF2B5EF4-FFF2-40B4-BE49-F238E27FC236}">
-                  <a16:creationId xmlns:a16="http://schemas.microsoft.com/office/drawing/2014/main" id="{0DC94438-0D97-1BAB-69A0-6881E49B1883}"/>
-                </a:ext>
-              </a:extLst>
-            </p:cNvPr>
-            <p:cNvGrpSpPr/>
-            <p:nvPr/>
-          </p:nvGrpSpPr>
-          <p:grpSpPr>
-            <a:xfrm>
-              <a:off x="622095" y="422479"/>
-              <a:ext cx="10947809" cy="3670707"/>
-              <a:chOff x="586966" y="1705179"/>
-              <a:chExt cx="10947809" cy="3670707"/>
-            </a:xfrm>
-          </p:grpSpPr>
-          <p:pic>
-            <p:nvPicPr>
-              <p:cNvPr id="6" name="Picture 5" descr="A black background with yellow letters and a black background&#10;&#10;Description automatically generated">
-                <a:extLst>
-                  <a:ext uri="{FF2B5EF4-FFF2-40B4-BE49-F238E27FC236}">
-                    <a16:creationId xmlns:a16="http://schemas.microsoft.com/office/drawing/2014/main" id="{ACCBA2E0-3184-E0E5-810D-0FB3DA40BAA6}"/>
-                  </a:ext>
-                </a:extLst>
-              </p:cNvPr>
-              <p:cNvPicPr>
-                <a:picLocks noChangeAspect="1"/>
-              </p:cNvPicPr>
-              <p:nvPr/>
-            </p:nvPicPr>
-            <p:blipFill>
-              <a:blip r:embed="rId2">
-                <a:extLst>
-                  <a:ext uri="{28A0092B-C50C-407E-A947-70E740481C1C}">
-                    <a14:useLocalDpi xmlns:a14="http://schemas.microsoft.com/office/drawing/2010/main" val="0"/>
-                  </a:ext>
-                </a:extLst>
-              </a:blip>
-              <a:stretch>
-                <a:fillRect/>
-              </a:stretch>
-            </p:blipFill>
-            <p:spPr>
-              <a:xfrm>
-                <a:off x="5532718" y="3701520"/>
-                <a:ext cx="1391011" cy="1674366"/>
-              </a:xfrm>
-              <a:prstGeom prst="rect">
-                <a:avLst/>
-              </a:prstGeom>
-            </p:spPr>
-          </p:pic>
-          <p:pic>
-            <p:nvPicPr>
-              <p:cNvPr id="7" name="Picture 6" descr="A black text on a white background&#10;&#10;Description automatically generated">
-                <a:extLst>
-                  <a:ext uri="{FF2B5EF4-FFF2-40B4-BE49-F238E27FC236}">
-                    <a16:creationId xmlns:a16="http://schemas.microsoft.com/office/drawing/2014/main" id="{A5673BB9-CF7F-645D-D853-167A94AA539E}"/>
-                  </a:ext>
-                </a:extLst>
-              </p:cNvPr>
-              <p:cNvPicPr>
-                <a:picLocks noChangeAspect="1"/>
-              </p:cNvPicPr>
-              <p:nvPr/>
-            </p:nvPicPr>
-            <p:blipFill>
-              <a:blip r:embed="rId3">
-                <a:extLst>
-                  <a:ext uri="{28A0092B-C50C-407E-A947-70E740481C1C}">
-                    <a14:useLocalDpi xmlns:a14="http://schemas.microsoft.com/office/drawing/2010/main" val="0"/>
-                  </a:ext>
-                </a:extLst>
-              </a:blip>
-              <a:stretch>
-                <a:fillRect/>
-              </a:stretch>
-            </p:blipFill>
-            <p:spPr>
-              <a:xfrm>
-                <a:off x="586966" y="2168274"/>
-                <a:ext cx="3217333" cy="497584"/>
-              </a:xfrm>
-              <a:prstGeom prst="rect">
-                <a:avLst/>
-              </a:prstGeom>
-            </p:spPr>
-          </p:pic>
-          <p:pic>
-            <p:nvPicPr>
-              <p:cNvPr id="8" name="Picture 7" descr="A black and red text&#10;&#10;Description automatically generated">
-                <a:extLst>
-                  <a:ext uri="{FF2B5EF4-FFF2-40B4-BE49-F238E27FC236}">
-                    <a16:creationId xmlns:a16="http://schemas.microsoft.com/office/drawing/2014/main" id="{F20BE04F-F0B4-D103-2FCF-6F3870D03774}"/>
-                  </a:ext>
-                </a:extLst>
-              </p:cNvPr>
-              <p:cNvPicPr>
-                <a:picLocks noChangeAspect="1"/>
-              </p:cNvPicPr>
-              <p:nvPr/>
-            </p:nvPicPr>
-            <p:blipFill>
-              <a:blip r:embed="rId4">
-                <a:extLst>
-                  <a:ext uri="{28A0092B-C50C-407E-A947-70E740481C1C}">
-                    <a14:useLocalDpi xmlns:a14="http://schemas.microsoft.com/office/drawing/2010/main" val="0"/>
-                  </a:ext>
-                </a:extLst>
-              </a:blip>
-              <a:stretch>
-                <a:fillRect/>
-              </a:stretch>
-            </p:blipFill>
-            <p:spPr>
-              <a:xfrm>
-                <a:off x="8614049" y="4179375"/>
-                <a:ext cx="2764057" cy="718656"/>
-              </a:xfrm>
-              <a:prstGeom prst="rect">
-                <a:avLst/>
-              </a:prstGeom>
-            </p:spPr>
-          </p:pic>
-          <p:pic>
-            <p:nvPicPr>
-              <p:cNvPr id="9" name="Picture 8" descr="Blue letters and a white background&#10;&#10;Description automatically generated">
-                <a:extLst>
-                  <a:ext uri="{FF2B5EF4-FFF2-40B4-BE49-F238E27FC236}">
-                    <a16:creationId xmlns:a16="http://schemas.microsoft.com/office/drawing/2014/main" id="{9BDA4390-F62B-E6E7-CCFE-D4F4B082172D}"/>
-                  </a:ext>
-                </a:extLst>
-              </p:cNvPr>
-              <p:cNvPicPr>
-                <a:picLocks noChangeAspect="1"/>
-              </p:cNvPicPr>
-              <p:nvPr/>
-            </p:nvPicPr>
-            <p:blipFill>
-              <a:blip r:embed="rId5">
-                <a:extLst>
-                  <a:ext uri="{28A0092B-C50C-407E-A947-70E740481C1C}">
-                    <a14:useLocalDpi xmlns:a14="http://schemas.microsoft.com/office/drawing/2010/main" val="0"/>
-                  </a:ext>
-                </a:extLst>
-              </a:blip>
-              <a:stretch>
-                <a:fillRect/>
-              </a:stretch>
-            </p:blipFill>
-            <p:spPr>
-              <a:xfrm>
-                <a:off x="8457381" y="1987860"/>
-                <a:ext cx="3077394" cy="1028362"/>
-              </a:xfrm>
-              <a:prstGeom prst="rect">
-                <a:avLst/>
-              </a:prstGeom>
-            </p:spPr>
-          </p:pic>
-          <p:pic>
-            <p:nvPicPr>
-              <p:cNvPr id="15" name="Picture 14" descr="A black screen with white text&#10;&#10;Description automatically generated">
-                <a:extLst>
-                  <a:ext uri="{FF2B5EF4-FFF2-40B4-BE49-F238E27FC236}">
-                    <a16:creationId xmlns:a16="http://schemas.microsoft.com/office/drawing/2014/main" id="{4C600F53-3502-5374-83B6-EC388363129D}"/>
-                  </a:ext>
-                </a:extLst>
-              </p:cNvPr>
-              <p:cNvPicPr>
-                <a:picLocks noChangeAspect="1"/>
-              </p:cNvPicPr>
-              <p:nvPr/>
-            </p:nvPicPr>
-            <p:blipFill>
-              <a:blip r:embed="rId6">
-                <a:extLst>
-                  <a:ext uri="{28A0092B-C50C-407E-A947-70E740481C1C}">
-                    <a14:useLocalDpi xmlns:a14="http://schemas.microsoft.com/office/drawing/2010/main" val="0"/>
-                  </a:ext>
-                </a:extLst>
-              </a:blip>
-              <a:stretch>
-                <a:fillRect/>
-              </a:stretch>
-            </p:blipFill>
-            <p:spPr>
-              <a:xfrm>
-                <a:off x="946799" y="3775686"/>
-                <a:ext cx="2857500" cy="1600200"/>
-              </a:xfrm>
-              <a:prstGeom prst="rect">
-                <a:avLst/>
-              </a:prstGeom>
-            </p:spPr>
-          </p:pic>
-          <p:pic>
-            <p:nvPicPr>
-              <p:cNvPr id="17" name="Picture 16" descr="A white rectangular sign with black text&#10;&#10;Description automatically generated">
-                <a:extLst>
-                  <a:ext uri="{FF2B5EF4-FFF2-40B4-BE49-F238E27FC236}">
-                    <a16:creationId xmlns:a16="http://schemas.microsoft.com/office/drawing/2014/main" id="{E1FFDC59-AFFC-B253-E20A-73B7E806BF8C}"/>
-                  </a:ext>
-                </a:extLst>
-              </p:cNvPr>
-              <p:cNvPicPr>
-                <a:picLocks noChangeAspect="1"/>
-              </p:cNvPicPr>
-              <p:nvPr/>
-            </p:nvPicPr>
-            <p:blipFill>
-              <a:blip r:embed="rId7">
-                <a:extLst>
-                  <a:ext uri="{28A0092B-C50C-407E-A947-70E740481C1C}">
-                    <a14:useLocalDpi xmlns:a14="http://schemas.microsoft.com/office/drawing/2010/main" val="0"/>
-                  </a:ext>
-                </a:extLst>
-              </a:blip>
-              <a:stretch>
-                <a:fillRect/>
-              </a:stretch>
-            </p:blipFill>
-            <p:spPr>
-              <a:xfrm>
-                <a:off x="4492540" y="1705179"/>
-                <a:ext cx="3276600" cy="1419206"/>
-              </a:xfrm>
-              <a:prstGeom prst="rect">
-                <a:avLst/>
-              </a:prstGeom>
-            </p:spPr>
-          </p:pic>
-        </p:grpSp>
-        <p:pic>
-          <p:nvPicPr>
-            <p:cNvPr id="3" name="Picture 2" descr="A purple text on a black background&#10;&#10;AI-generated content may be incorrect.">
-              <a:extLst>
-                <a:ext uri="{FF2B5EF4-FFF2-40B4-BE49-F238E27FC236}">
-                  <a16:creationId xmlns:a16="http://schemas.microsoft.com/office/drawing/2014/main" id="{CEF673C4-2F89-19BA-5A72-3CA43319B9BA}"/>
+                  <a16:creationId xmlns:a16="http://schemas.microsoft.com/office/drawing/2014/main" id="{ACCBA2E0-3184-E0E5-810D-0FB3DA40BAA6}"/>
                 </a:ext>
               </a:extLst>
             </p:cNvPr>
@@ -3619,7 +3382,7 @@
             <p:nvPr/>
           </p:nvPicPr>
           <p:blipFill>
-            <a:blip r:embed="rId8">
+            <a:blip r:embed="rId2">
               <a:extLst>
                 <a:ext uri="{28A0092B-C50C-407E-A947-70E740481C1C}">
                   <a14:useLocalDpi xmlns:a14="http://schemas.microsoft.com/office/drawing/2010/main" val="0"/>
@@ -3632,8 +3395,8 @@
           </p:blipFill>
           <p:spPr>
             <a:xfrm>
-              <a:off x="5948850" y="4600537"/>
-              <a:ext cx="3847692" cy="1490981"/>
+              <a:off x="5532718" y="3701520"/>
+              <a:ext cx="1391011" cy="1674366"/>
             </a:xfrm>
             <a:prstGeom prst="rect">
               <a:avLst/>
@@ -3642,10 +3405,10 @@
         </p:pic>
         <p:pic>
           <p:nvPicPr>
-            <p:cNvPr id="5" name="Picture 4" descr="Blue text on a black background&#10;&#10;AI-generated content may be incorrect.">
+            <p:cNvPr id="7" name="Picture 6" descr="A black text on a white background&#10;&#10;Description automatically generated">
               <a:extLst>
                 <a:ext uri="{FF2B5EF4-FFF2-40B4-BE49-F238E27FC236}">
-                  <a16:creationId xmlns:a16="http://schemas.microsoft.com/office/drawing/2014/main" id="{3ADAA09A-0E12-3D9A-BE61-816CB16C56C7}"/>
+                  <a16:creationId xmlns:a16="http://schemas.microsoft.com/office/drawing/2014/main" id="{A5673BB9-CF7F-645D-D853-167A94AA539E}"/>
                 </a:ext>
               </a:extLst>
             </p:cNvPr>
@@ -3655,7 +3418,7 @@
             <p:nvPr/>
           </p:nvPicPr>
           <p:blipFill>
-            <a:blip r:embed="rId9">
+            <a:blip r:embed="rId3">
               <a:extLst>
                 <a:ext uri="{28A0092B-C50C-407E-A947-70E740481C1C}">
                   <a14:useLocalDpi xmlns:a14="http://schemas.microsoft.com/office/drawing/2010/main" val="0"/>
@@ -3668,8 +3431,152 @@
           </p:blipFill>
           <p:spPr>
             <a:xfrm>
-              <a:off x="2583658" y="4988722"/>
-              <a:ext cx="2872728" cy="714610"/>
+              <a:off x="586966" y="2168274"/>
+              <a:ext cx="3217333" cy="497584"/>
+            </a:xfrm>
+            <a:prstGeom prst="rect">
+              <a:avLst/>
+            </a:prstGeom>
+          </p:spPr>
+        </p:pic>
+        <p:pic>
+          <p:nvPicPr>
+            <p:cNvPr id="8" name="Picture 7" descr="A black and red text&#10;&#10;Description automatically generated">
+              <a:extLst>
+                <a:ext uri="{FF2B5EF4-FFF2-40B4-BE49-F238E27FC236}">
+                  <a16:creationId xmlns:a16="http://schemas.microsoft.com/office/drawing/2014/main" id="{F20BE04F-F0B4-D103-2FCF-6F3870D03774}"/>
+                </a:ext>
+              </a:extLst>
+            </p:cNvPr>
+            <p:cNvPicPr>
+              <a:picLocks noChangeAspect="1"/>
+            </p:cNvPicPr>
+            <p:nvPr/>
+          </p:nvPicPr>
+          <p:blipFill>
+            <a:blip r:embed="rId4">
+              <a:extLst>
+                <a:ext uri="{28A0092B-C50C-407E-A947-70E740481C1C}">
+                  <a14:useLocalDpi xmlns:a14="http://schemas.microsoft.com/office/drawing/2010/main" val="0"/>
+                </a:ext>
+              </a:extLst>
+            </a:blip>
+            <a:stretch>
+              <a:fillRect/>
+            </a:stretch>
+          </p:blipFill>
+          <p:spPr>
+            <a:xfrm>
+              <a:off x="8614049" y="4179375"/>
+              <a:ext cx="2764057" cy="718656"/>
+            </a:xfrm>
+            <a:prstGeom prst="rect">
+              <a:avLst/>
+            </a:prstGeom>
+          </p:spPr>
+        </p:pic>
+        <p:pic>
+          <p:nvPicPr>
+            <p:cNvPr id="9" name="Picture 8" descr="Blue letters and a white background&#10;&#10;Description automatically generated">
+              <a:extLst>
+                <a:ext uri="{FF2B5EF4-FFF2-40B4-BE49-F238E27FC236}">
+                  <a16:creationId xmlns:a16="http://schemas.microsoft.com/office/drawing/2014/main" id="{9BDA4390-F62B-E6E7-CCFE-D4F4B082172D}"/>
+                </a:ext>
+              </a:extLst>
+            </p:cNvPr>
+            <p:cNvPicPr>
+              <a:picLocks noChangeAspect="1"/>
+            </p:cNvPicPr>
+            <p:nvPr/>
+          </p:nvPicPr>
+          <p:blipFill>
+            <a:blip r:embed="rId5">
+              <a:extLst>
+                <a:ext uri="{28A0092B-C50C-407E-A947-70E740481C1C}">
+                  <a14:useLocalDpi xmlns:a14="http://schemas.microsoft.com/office/drawing/2010/main" val="0"/>
+                </a:ext>
+              </a:extLst>
+            </a:blip>
+            <a:stretch>
+              <a:fillRect/>
+            </a:stretch>
+          </p:blipFill>
+          <p:spPr>
+            <a:xfrm>
+              <a:off x="8457381" y="1987860"/>
+              <a:ext cx="3077394" cy="1028362"/>
+            </a:xfrm>
+            <a:prstGeom prst="rect">
+              <a:avLst/>
+            </a:prstGeom>
+          </p:spPr>
+        </p:pic>
+        <p:pic>
+          <p:nvPicPr>
+            <p:cNvPr id="15" name="Picture 14" descr="A black screen with white text&#10;&#10;Description automatically generated">
+              <a:extLst>
+                <a:ext uri="{FF2B5EF4-FFF2-40B4-BE49-F238E27FC236}">
+                  <a16:creationId xmlns:a16="http://schemas.microsoft.com/office/drawing/2014/main" id="{4C600F53-3502-5374-83B6-EC388363129D}"/>
+                </a:ext>
+              </a:extLst>
+            </p:cNvPr>
+            <p:cNvPicPr>
+              <a:picLocks noChangeAspect="1"/>
+            </p:cNvPicPr>
+            <p:nvPr/>
+          </p:nvPicPr>
+          <p:blipFill>
+            <a:blip r:embed="rId6">
+              <a:extLst>
+                <a:ext uri="{28A0092B-C50C-407E-A947-70E740481C1C}">
+                  <a14:useLocalDpi xmlns:a14="http://schemas.microsoft.com/office/drawing/2010/main" val="0"/>
+                </a:ext>
+              </a:extLst>
+            </a:blip>
+            <a:stretch>
+              <a:fillRect/>
+            </a:stretch>
+          </p:blipFill>
+          <p:spPr>
+            <a:xfrm>
+              <a:off x="946799" y="3775686"/>
+              <a:ext cx="2857500" cy="1600200"/>
+            </a:xfrm>
+            <a:prstGeom prst="rect">
+              <a:avLst/>
+            </a:prstGeom>
+          </p:spPr>
+        </p:pic>
+        <p:pic>
+          <p:nvPicPr>
+            <p:cNvPr id="17" name="Picture 16" descr="A white rectangular sign with black text&#10;&#10;Description automatically generated">
+              <a:extLst>
+                <a:ext uri="{FF2B5EF4-FFF2-40B4-BE49-F238E27FC236}">
+                  <a16:creationId xmlns:a16="http://schemas.microsoft.com/office/drawing/2014/main" id="{E1FFDC59-AFFC-B253-E20A-73B7E806BF8C}"/>
+                </a:ext>
+              </a:extLst>
+            </p:cNvPr>
+            <p:cNvPicPr>
+              <a:picLocks noChangeAspect="1"/>
+            </p:cNvPicPr>
+            <p:nvPr/>
+          </p:nvPicPr>
+          <p:blipFill>
+            <a:blip r:embed="rId7">
+              <a:extLst>
+                <a:ext uri="{28A0092B-C50C-407E-A947-70E740481C1C}">
+                  <a14:useLocalDpi xmlns:a14="http://schemas.microsoft.com/office/drawing/2010/main" val="0"/>
+                </a:ext>
+              </a:extLst>
+            </a:blip>
+            <a:stretch>
+              <a:fillRect/>
+            </a:stretch>
+          </p:blipFill>
+          <p:spPr>
+            <a:xfrm>
+              <a:off x="4492540" y="1705179"/>
+              <a:ext cx="3276600" cy="1419206"/>
             </a:xfrm>
             <a:prstGeom prst="rect">
               <a:avLst/>
@@ -3677,6 +3584,114 @@
           </p:spPr>
         </p:pic>
       </p:grpSp>
+      <p:pic>
+        <p:nvPicPr>
+          <p:cNvPr id="3" name="Picture 2" descr="A purple text on a black background&#10;&#10;AI-generated content may be incorrect.">
+            <a:extLst>
+              <a:ext uri="{FF2B5EF4-FFF2-40B4-BE49-F238E27FC236}">
+                <a16:creationId xmlns:a16="http://schemas.microsoft.com/office/drawing/2014/main" id="{CEF673C4-2F89-19BA-5A72-3CA43319B9BA}"/>
+              </a:ext>
+            </a:extLst>
+          </p:cNvPr>
+          <p:cNvPicPr>
+            <a:picLocks noChangeAspect="1"/>
+          </p:cNvPicPr>
+          <p:nvPr/>
+        </p:nvPicPr>
+        <p:blipFill>
+          <a:blip r:embed="rId8">
+            <a:extLst>
+              <a:ext uri="{28A0092B-C50C-407E-A947-70E740481C1C}">
+                <a14:useLocalDpi xmlns:a14="http://schemas.microsoft.com/office/drawing/2010/main" val="0"/>
+              </a:ext>
+            </a:extLst>
+          </a:blip>
+          <a:stretch>
+            <a:fillRect/>
+          </a:stretch>
+        </p:blipFill>
+        <p:spPr>
+          <a:xfrm>
+            <a:off x="7841150" y="4600537"/>
+            <a:ext cx="3847692" cy="1490981"/>
+          </a:xfrm>
+          <a:prstGeom prst="rect">
+            <a:avLst/>
+          </a:prstGeom>
+        </p:spPr>
+      </p:pic>
+      <p:pic>
+        <p:nvPicPr>
+          <p:cNvPr id="5" name="Picture 4" descr="Blue text on a black background&#10;&#10;AI-generated content may be incorrect.">
+            <a:extLst>
+              <a:ext uri="{FF2B5EF4-FFF2-40B4-BE49-F238E27FC236}">
+                <a16:creationId xmlns:a16="http://schemas.microsoft.com/office/drawing/2014/main" id="{3ADAA09A-0E12-3D9A-BE61-816CB16C56C7}"/>
+              </a:ext>
+            </a:extLst>
+          </p:cNvPr>
+          <p:cNvPicPr>
+            <a:picLocks noChangeAspect="1"/>
+          </p:cNvPicPr>
+          <p:nvPr/>
+        </p:nvPicPr>
+        <p:blipFill>
+          <a:blip r:embed="rId9">
+            <a:extLst>
+              <a:ext uri="{28A0092B-C50C-407E-A947-70E740481C1C}">
+                <a14:useLocalDpi xmlns:a14="http://schemas.microsoft.com/office/drawing/2010/main" val="0"/>
+              </a:ext>
+            </a:extLst>
+          </a:blip>
+          <a:stretch>
+            <a:fillRect/>
+          </a:stretch>
+        </p:blipFill>
+        <p:spPr>
+          <a:xfrm>
+            <a:off x="4475958" y="4988722"/>
+            <a:ext cx="2872728" cy="714610"/>
+          </a:xfrm>
+          <a:prstGeom prst="rect">
+            <a:avLst/>
+          </a:prstGeom>
+        </p:spPr>
+      </p:pic>
+      <p:pic>
+        <p:nvPicPr>
+          <p:cNvPr id="4" name="Picture 3" descr="A green and blue text&#10;&#10;AI-generated content may be incorrect.">
+            <a:extLst>
+              <a:ext uri="{FF2B5EF4-FFF2-40B4-BE49-F238E27FC236}">
+                <a16:creationId xmlns:a16="http://schemas.microsoft.com/office/drawing/2014/main" id="{70A533A1-31CE-F74E-B206-B071CB997488}"/>
+              </a:ext>
+            </a:extLst>
+          </p:cNvPr>
+          <p:cNvPicPr>
+            <a:picLocks noChangeAspect="1"/>
+          </p:cNvPicPr>
+          <p:nvPr/>
+        </p:nvPicPr>
+        <p:blipFill>
+          <a:blip r:embed="rId10">
+            <a:extLst>
+              <a:ext uri="{28A0092B-C50C-407E-A947-70E740481C1C}">
+                <a14:useLocalDpi xmlns:a14="http://schemas.microsoft.com/office/drawing/2010/main" val="0"/>
+              </a:ext>
+            </a:extLst>
+          </a:blip>
+          <a:stretch>
+            <a:fillRect/>
+          </a:stretch>
+        </p:blipFill>
+        <p:spPr>
+          <a:xfrm>
+            <a:off x="796505" y="4988720"/>
+            <a:ext cx="2868512" cy="714612"/>
+          </a:xfrm>
+          <a:prstGeom prst="rect">
+            <a:avLst/>
+          </a:prstGeom>
+        </p:spPr>
+      </p:pic>
     </p:spTree>
     <p:extLst>
       <p:ext uri="{BB962C8B-B14F-4D97-AF65-F5344CB8AC3E}">

</xml_diff>

<commit_message>
add cookie banner consent
</commit_message>
<xml_diff>
--- a/images/partners.pptx
+++ b/images/partners.pptx
@@ -3349,10 +3349,10 @@
       </p:grpSpPr>
       <p:grpSp>
         <p:nvGrpSpPr>
-          <p:cNvPr id="18" name="Group 17">
-            <a:extLst>
-              <a:ext uri="{FF2B5EF4-FFF2-40B4-BE49-F238E27FC236}">
-                <a16:creationId xmlns:a16="http://schemas.microsoft.com/office/drawing/2014/main" id="{0DC94438-0D97-1BAB-69A0-6881E49B1883}"/>
+          <p:cNvPr id="11" name="Group 10">
+            <a:extLst>
+              <a:ext uri="{FF2B5EF4-FFF2-40B4-BE49-F238E27FC236}">
+                <a16:creationId xmlns:a16="http://schemas.microsoft.com/office/drawing/2014/main" id="{6A20DDAE-A20C-E0AE-77CB-BB843E7A4E0F}"/>
               </a:ext>
             </a:extLst>
           </p:cNvPr>
@@ -3362,17 +3362,254 @@
         <p:grpSpPr>
           <a:xfrm>
             <a:off x="622095" y="422479"/>
-            <a:ext cx="10947809" cy="3670707"/>
-            <a:chOff x="586966" y="1705179"/>
-            <a:chExt cx="10947809" cy="3670707"/>
+            <a:ext cx="11066747" cy="5669039"/>
+            <a:chOff x="622095" y="422479"/>
+            <a:chExt cx="11066747" cy="5669039"/>
           </a:xfrm>
         </p:grpSpPr>
+        <p:grpSp>
+          <p:nvGrpSpPr>
+            <p:cNvPr id="18" name="Group 17">
+              <a:extLst>
+                <a:ext uri="{FF2B5EF4-FFF2-40B4-BE49-F238E27FC236}">
+                  <a16:creationId xmlns:a16="http://schemas.microsoft.com/office/drawing/2014/main" id="{0DC94438-0D97-1BAB-69A0-6881E49B1883}"/>
+                </a:ext>
+              </a:extLst>
+            </p:cNvPr>
+            <p:cNvGrpSpPr/>
+            <p:nvPr/>
+          </p:nvGrpSpPr>
+          <p:grpSpPr>
+            <a:xfrm>
+              <a:off x="622095" y="422479"/>
+              <a:ext cx="10947809" cy="3670707"/>
+              <a:chOff x="586966" y="1705179"/>
+              <a:chExt cx="10947809" cy="3670707"/>
+            </a:xfrm>
+          </p:grpSpPr>
+          <p:pic>
+            <p:nvPicPr>
+              <p:cNvPr id="6" name="Picture 5" descr="A black background with yellow letters and a black background&#10;&#10;Description automatically generated">
+                <a:extLst>
+                  <a:ext uri="{FF2B5EF4-FFF2-40B4-BE49-F238E27FC236}">
+                    <a16:creationId xmlns:a16="http://schemas.microsoft.com/office/drawing/2014/main" id="{ACCBA2E0-3184-E0E5-810D-0FB3DA40BAA6}"/>
+                  </a:ext>
+                </a:extLst>
+              </p:cNvPr>
+              <p:cNvPicPr>
+                <a:picLocks noChangeAspect="1"/>
+              </p:cNvPicPr>
+              <p:nvPr/>
+            </p:nvPicPr>
+            <p:blipFill>
+              <a:blip r:embed="rId2">
+                <a:extLst>
+                  <a:ext uri="{28A0092B-C50C-407E-A947-70E740481C1C}">
+                    <a14:useLocalDpi xmlns:a14="http://schemas.microsoft.com/office/drawing/2010/main" val="0"/>
+                  </a:ext>
+                </a:extLst>
+              </a:blip>
+              <a:stretch>
+                <a:fillRect/>
+              </a:stretch>
+            </p:blipFill>
+            <p:spPr>
+              <a:xfrm>
+                <a:off x="5532718" y="3701520"/>
+                <a:ext cx="1391011" cy="1674366"/>
+              </a:xfrm>
+              <a:prstGeom prst="rect">
+                <a:avLst/>
+              </a:prstGeom>
+            </p:spPr>
+          </p:pic>
+          <p:pic>
+            <p:nvPicPr>
+              <p:cNvPr id="7" name="Picture 6" descr="A black text on a white background&#10;&#10;Description automatically generated">
+                <a:extLst>
+                  <a:ext uri="{FF2B5EF4-FFF2-40B4-BE49-F238E27FC236}">
+                    <a16:creationId xmlns:a16="http://schemas.microsoft.com/office/drawing/2014/main" id="{A5673BB9-CF7F-645D-D853-167A94AA539E}"/>
+                  </a:ext>
+                </a:extLst>
+              </p:cNvPr>
+              <p:cNvPicPr>
+                <a:picLocks noChangeAspect="1"/>
+              </p:cNvPicPr>
+              <p:nvPr/>
+            </p:nvPicPr>
+            <p:blipFill>
+              <a:blip r:embed="rId3">
+                <a:extLst>
+                  <a:ext uri="{28A0092B-C50C-407E-A947-70E740481C1C}">
+                    <a14:useLocalDpi xmlns:a14="http://schemas.microsoft.com/office/drawing/2010/main" val="0"/>
+                  </a:ext>
+                </a:extLst>
+              </a:blip>
+              <a:stretch>
+                <a:fillRect/>
+              </a:stretch>
+            </p:blipFill>
+            <p:spPr>
+              <a:xfrm>
+                <a:off x="586966" y="2168274"/>
+                <a:ext cx="3217333" cy="497584"/>
+              </a:xfrm>
+              <a:prstGeom prst="rect">
+                <a:avLst/>
+              </a:prstGeom>
+            </p:spPr>
+          </p:pic>
+          <p:pic>
+            <p:nvPicPr>
+              <p:cNvPr id="8" name="Picture 7" descr="A black and red text&#10;&#10;Description automatically generated">
+                <a:extLst>
+                  <a:ext uri="{FF2B5EF4-FFF2-40B4-BE49-F238E27FC236}">
+                    <a16:creationId xmlns:a16="http://schemas.microsoft.com/office/drawing/2014/main" id="{F20BE04F-F0B4-D103-2FCF-6F3870D03774}"/>
+                  </a:ext>
+                </a:extLst>
+              </p:cNvPr>
+              <p:cNvPicPr>
+                <a:picLocks noChangeAspect="1"/>
+              </p:cNvPicPr>
+              <p:nvPr/>
+            </p:nvPicPr>
+            <p:blipFill>
+              <a:blip r:embed="rId4">
+                <a:extLst>
+                  <a:ext uri="{28A0092B-C50C-407E-A947-70E740481C1C}">
+                    <a14:useLocalDpi xmlns:a14="http://schemas.microsoft.com/office/drawing/2010/main" val="0"/>
+                  </a:ext>
+                </a:extLst>
+              </a:blip>
+              <a:stretch>
+                <a:fillRect/>
+              </a:stretch>
+            </p:blipFill>
+            <p:spPr>
+              <a:xfrm>
+                <a:off x="8614049" y="4179375"/>
+                <a:ext cx="2764057" cy="718656"/>
+              </a:xfrm>
+              <a:prstGeom prst="rect">
+                <a:avLst/>
+              </a:prstGeom>
+            </p:spPr>
+          </p:pic>
+          <p:pic>
+            <p:nvPicPr>
+              <p:cNvPr id="9" name="Picture 8" descr="Blue letters and a white background&#10;&#10;Description automatically generated">
+                <a:extLst>
+                  <a:ext uri="{FF2B5EF4-FFF2-40B4-BE49-F238E27FC236}">
+                    <a16:creationId xmlns:a16="http://schemas.microsoft.com/office/drawing/2014/main" id="{9BDA4390-F62B-E6E7-CCFE-D4F4B082172D}"/>
+                  </a:ext>
+                </a:extLst>
+              </p:cNvPr>
+              <p:cNvPicPr>
+                <a:picLocks noChangeAspect="1"/>
+              </p:cNvPicPr>
+              <p:nvPr/>
+            </p:nvPicPr>
+            <p:blipFill>
+              <a:blip r:embed="rId5">
+                <a:extLst>
+                  <a:ext uri="{28A0092B-C50C-407E-A947-70E740481C1C}">
+                    <a14:useLocalDpi xmlns:a14="http://schemas.microsoft.com/office/drawing/2010/main" val="0"/>
+                  </a:ext>
+                </a:extLst>
+              </a:blip>
+              <a:stretch>
+                <a:fillRect/>
+              </a:stretch>
+            </p:blipFill>
+            <p:spPr>
+              <a:xfrm>
+                <a:off x="8457381" y="1987860"/>
+                <a:ext cx="3077394" cy="1028362"/>
+              </a:xfrm>
+              <a:prstGeom prst="rect">
+                <a:avLst/>
+              </a:prstGeom>
+            </p:spPr>
+          </p:pic>
+          <p:pic>
+            <p:nvPicPr>
+              <p:cNvPr id="15" name="Picture 14" descr="A black screen with white text&#10;&#10;Description automatically generated">
+                <a:extLst>
+                  <a:ext uri="{FF2B5EF4-FFF2-40B4-BE49-F238E27FC236}">
+                    <a16:creationId xmlns:a16="http://schemas.microsoft.com/office/drawing/2014/main" id="{4C600F53-3502-5374-83B6-EC388363129D}"/>
+                  </a:ext>
+                </a:extLst>
+              </p:cNvPr>
+              <p:cNvPicPr>
+                <a:picLocks noChangeAspect="1"/>
+              </p:cNvPicPr>
+              <p:nvPr/>
+            </p:nvPicPr>
+            <p:blipFill>
+              <a:blip r:embed="rId6">
+                <a:extLst>
+                  <a:ext uri="{28A0092B-C50C-407E-A947-70E740481C1C}">
+                    <a14:useLocalDpi xmlns:a14="http://schemas.microsoft.com/office/drawing/2010/main" val="0"/>
+                  </a:ext>
+                </a:extLst>
+              </a:blip>
+              <a:stretch>
+                <a:fillRect/>
+              </a:stretch>
+            </p:blipFill>
+            <p:spPr>
+              <a:xfrm>
+                <a:off x="946799" y="3775686"/>
+                <a:ext cx="2857500" cy="1600200"/>
+              </a:xfrm>
+              <a:prstGeom prst="rect">
+                <a:avLst/>
+              </a:prstGeom>
+            </p:spPr>
+          </p:pic>
+          <p:pic>
+            <p:nvPicPr>
+              <p:cNvPr id="17" name="Picture 16" descr="A white rectangular sign with black text&#10;&#10;Description automatically generated">
+                <a:extLst>
+                  <a:ext uri="{FF2B5EF4-FFF2-40B4-BE49-F238E27FC236}">
+                    <a16:creationId xmlns:a16="http://schemas.microsoft.com/office/drawing/2014/main" id="{E1FFDC59-AFFC-B253-E20A-73B7E806BF8C}"/>
+                  </a:ext>
+                </a:extLst>
+              </p:cNvPr>
+              <p:cNvPicPr>
+                <a:picLocks noChangeAspect="1"/>
+              </p:cNvPicPr>
+              <p:nvPr/>
+            </p:nvPicPr>
+            <p:blipFill>
+              <a:blip r:embed="rId7">
+                <a:extLst>
+                  <a:ext uri="{28A0092B-C50C-407E-A947-70E740481C1C}">
+                    <a14:useLocalDpi xmlns:a14="http://schemas.microsoft.com/office/drawing/2010/main" val="0"/>
+                  </a:ext>
+                </a:extLst>
+              </a:blip>
+              <a:stretch>
+                <a:fillRect/>
+              </a:stretch>
+            </p:blipFill>
+            <p:spPr>
+              <a:xfrm>
+                <a:off x="4492540" y="1705179"/>
+                <a:ext cx="3276600" cy="1419206"/>
+              </a:xfrm>
+              <a:prstGeom prst="rect">
+                <a:avLst/>
+              </a:prstGeom>
+            </p:spPr>
+          </p:pic>
+        </p:grpSp>
         <p:pic>
           <p:nvPicPr>
-            <p:cNvPr id="6" name="Picture 5" descr="A black background with yellow letters and a black background&#10;&#10;Description automatically generated">
+            <p:cNvPr id="3" name="Picture 2" descr="A purple text on a black background&#10;&#10;AI-generated content may be incorrect.">
               <a:extLst>
                 <a:ext uri="{FF2B5EF4-FFF2-40B4-BE49-F238E27FC236}">
-                  <a16:creationId xmlns:a16="http://schemas.microsoft.com/office/drawing/2014/main" id="{ACCBA2E0-3184-E0E5-810D-0FB3DA40BAA6}"/>
+                  <a16:creationId xmlns:a16="http://schemas.microsoft.com/office/drawing/2014/main" id="{CEF673C4-2F89-19BA-5A72-3CA43319B9BA}"/>
                 </a:ext>
               </a:extLst>
             </p:cNvPr>
@@ -3382,7 +3619,7 @@
             <p:nvPr/>
           </p:nvPicPr>
           <p:blipFill>
-            <a:blip r:embed="rId2">
+            <a:blip r:embed="rId8">
               <a:extLst>
                 <a:ext uri="{28A0092B-C50C-407E-A947-70E740481C1C}">
                   <a14:useLocalDpi xmlns:a14="http://schemas.microsoft.com/office/drawing/2010/main" val="0"/>
@@ -3395,8 +3632,8 @@
           </p:blipFill>
           <p:spPr>
             <a:xfrm>
-              <a:off x="5532718" y="3701520"/>
-              <a:ext cx="1391011" cy="1674366"/>
+              <a:off x="7841150" y="4600537"/>
+              <a:ext cx="3847692" cy="1490981"/>
             </a:xfrm>
             <a:prstGeom prst="rect">
               <a:avLst/>
@@ -3405,10 +3642,10 @@
         </p:pic>
         <p:pic>
           <p:nvPicPr>
-            <p:cNvPr id="7" name="Picture 6" descr="A black text on a white background&#10;&#10;Description automatically generated">
+            <p:cNvPr id="5" name="Picture 4" descr="Blue text on a black background&#10;&#10;AI-generated content may be incorrect.">
               <a:extLst>
                 <a:ext uri="{FF2B5EF4-FFF2-40B4-BE49-F238E27FC236}">
-                  <a16:creationId xmlns:a16="http://schemas.microsoft.com/office/drawing/2014/main" id="{A5673BB9-CF7F-645D-D853-167A94AA539E}"/>
+                  <a16:creationId xmlns:a16="http://schemas.microsoft.com/office/drawing/2014/main" id="{3ADAA09A-0E12-3D9A-BE61-816CB16C56C7}"/>
                 </a:ext>
               </a:extLst>
             </p:cNvPr>
@@ -3418,7 +3655,7 @@
             <p:nvPr/>
           </p:nvPicPr>
           <p:blipFill>
-            <a:blip r:embed="rId3">
+            <a:blip r:embed="rId9">
               <a:extLst>
                 <a:ext uri="{28A0092B-C50C-407E-A947-70E740481C1C}">
                   <a14:useLocalDpi xmlns:a14="http://schemas.microsoft.com/office/drawing/2010/main" val="0"/>
@@ -3431,8 +3668,8 @@
           </p:blipFill>
           <p:spPr>
             <a:xfrm>
-              <a:off x="586966" y="2168274"/>
-              <a:ext cx="3217333" cy="497584"/>
+              <a:off x="4475958" y="4988722"/>
+              <a:ext cx="2872728" cy="714610"/>
             </a:xfrm>
             <a:prstGeom prst="rect">
               <a:avLst/>
@@ -3441,10 +3678,10 @@
         </p:pic>
         <p:pic>
           <p:nvPicPr>
-            <p:cNvPr id="8" name="Picture 7" descr="A black and red text&#10;&#10;Description automatically generated">
+            <p:cNvPr id="4" name="Picture 3" descr="A green and blue text&#10;&#10;AI-generated content may be incorrect.">
               <a:extLst>
                 <a:ext uri="{FF2B5EF4-FFF2-40B4-BE49-F238E27FC236}">
-                  <a16:creationId xmlns:a16="http://schemas.microsoft.com/office/drawing/2014/main" id="{F20BE04F-F0B4-D103-2FCF-6F3870D03774}"/>
+                  <a16:creationId xmlns:a16="http://schemas.microsoft.com/office/drawing/2014/main" id="{70A533A1-31CE-F74E-B206-B071CB997488}"/>
                 </a:ext>
               </a:extLst>
             </p:cNvPr>
@@ -3454,7 +3691,7 @@
             <p:nvPr/>
           </p:nvPicPr>
           <p:blipFill>
-            <a:blip r:embed="rId4">
+            <a:blip r:embed="rId10">
               <a:extLst>
                 <a:ext uri="{28A0092B-C50C-407E-A947-70E740481C1C}">
                   <a14:useLocalDpi xmlns:a14="http://schemas.microsoft.com/office/drawing/2010/main" val="0"/>
@@ -3467,116 +3704,8 @@
           </p:blipFill>
           <p:spPr>
             <a:xfrm>
-              <a:off x="8614049" y="4179375"/>
-              <a:ext cx="2764057" cy="718656"/>
-            </a:xfrm>
-            <a:prstGeom prst="rect">
-              <a:avLst/>
-            </a:prstGeom>
-          </p:spPr>
-        </p:pic>
-        <p:pic>
-          <p:nvPicPr>
-            <p:cNvPr id="9" name="Picture 8" descr="Blue letters and a white background&#10;&#10;Description automatically generated">
-              <a:extLst>
-                <a:ext uri="{FF2B5EF4-FFF2-40B4-BE49-F238E27FC236}">
-                  <a16:creationId xmlns:a16="http://schemas.microsoft.com/office/drawing/2014/main" id="{9BDA4390-F62B-E6E7-CCFE-D4F4B082172D}"/>
-                </a:ext>
-              </a:extLst>
-            </p:cNvPr>
-            <p:cNvPicPr>
-              <a:picLocks noChangeAspect="1"/>
-            </p:cNvPicPr>
-            <p:nvPr/>
-          </p:nvPicPr>
-          <p:blipFill>
-            <a:blip r:embed="rId5">
-              <a:extLst>
-                <a:ext uri="{28A0092B-C50C-407E-A947-70E740481C1C}">
-                  <a14:useLocalDpi xmlns:a14="http://schemas.microsoft.com/office/drawing/2010/main" val="0"/>
-                </a:ext>
-              </a:extLst>
-            </a:blip>
-            <a:stretch>
-              <a:fillRect/>
-            </a:stretch>
-          </p:blipFill>
-          <p:spPr>
-            <a:xfrm>
-              <a:off x="8457381" y="1987860"/>
-              <a:ext cx="3077394" cy="1028362"/>
-            </a:xfrm>
-            <a:prstGeom prst="rect">
-              <a:avLst/>
-            </a:prstGeom>
-          </p:spPr>
-        </p:pic>
-        <p:pic>
-          <p:nvPicPr>
-            <p:cNvPr id="15" name="Picture 14" descr="A black screen with white text&#10;&#10;Description automatically generated">
-              <a:extLst>
-                <a:ext uri="{FF2B5EF4-FFF2-40B4-BE49-F238E27FC236}">
-                  <a16:creationId xmlns:a16="http://schemas.microsoft.com/office/drawing/2014/main" id="{4C600F53-3502-5374-83B6-EC388363129D}"/>
-                </a:ext>
-              </a:extLst>
-            </p:cNvPr>
-            <p:cNvPicPr>
-              <a:picLocks noChangeAspect="1"/>
-            </p:cNvPicPr>
-            <p:nvPr/>
-          </p:nvPicPr>
-          <p:blipFill>
-            <a:blip r:embed="rId6">
-              <a:extLst>
-                <a:ext uri="{28A0092B-C50C-407E-A947-70E740481C1C}">
-                  <a14:useLocalDpi xmlns:a14="http://schemas.microsoft.com/office/drawing/2010/main" val="0"/>
-                </a:ext>
-              </a:extLst>
-            </a:blip>
-            <a:stretch>
-              <a:fillRect/>
-            </a:stretch>
-          </p:blipFill>
-          <p:spPr>
-            <a:xfrm>
-              <a:off x="946799" y="3775686"/>
-              <a:ext cx="2857500" cy="1600200"/>
-            </a:xfrm>
-            <a:prstGeom prst="rect">
-              <a:avLst/>
-            </a:prstGeom>
-          </p:spPr>
-        </p:pic>
-        <p:pic>
-          <p:nvPicPr>
-            <p:cNvPr id="17" name="Picture 16" descr="A white rectangular sign with black text&#10;&#10;Description automatically generated">
-              <a:extLst>
-                <a:ext uri="{FF2B5EF4-FFF2-40B4-BE49-F238E27FC236}">
-                  <a16:creationId xmlns:a16="http://schemas.microsoft.com/office/drawing/2014/main" id="{E1FFDC59-AFFC-B253-E20A-73B7E806BF8C}"/>
-                </a:ext>
-              </a:extLst>
-            </p:cNvPr>
-            <p:cNvPicPr>
-              <a:picLocks noChangeAspect="1"/>
-            </p:cNvPicPr>
-            <p:nvPr/>
-          </p:nvPicPr>
-          <p:blipFill>
-            <a:blip r:embed="rId7">
-              <a:extLst>
-                <a:ext uri="{28A0092B-C50C-407E-A947-70E740481C1C}">
-                  <a14:useLocalDpi xmlns:a14="http://schemas.microsoft.com/office/drawing/2010/main" val="0"/>
-                </a:ext>
-              </a:extLst>
-            </a:blip>
-            <a:stretch>
-              <a:fillRect/>
-            </a:stretch>
-          </p:blipFill>
-          <p:spPr>
-            <a:xfrm>
-              <a:off x="4492540" y="1705179"/>
-              <a:ext cx="3276600" cy="1419206"/>
+              <a:off x="796505" y="4988720"/>
+              <a:ext cx="2868512" cy="714612"/>
             </a:xfrm>
             <a:prstGeom prst="rect">
               <a:avLst/>
@@ -3584,114 +3713,6 @@
           </p:spPr>
         </p:pic>
       </p:grpSp>
-      <p:pic>
-        <p:nvPicPr>
-          <p:cNvPr id="3" name="Picture 2" descr="A purple text on a black background&#10;&#10;AI-generated content may be incorrect.">
-            <a:extLst>
-              <a:ext uri="{FF2B5EF4-FFF2-40B4-BE49-F238E27FC236}">
-                <a16:creationId xmlns:a16="http://schemas.microsoft.com/office/drawing/2014/main" id="{CEF673C4-2F89-19BA-5A72-3CA43319B9BA}"/>
-              </a:ext>
-            </a:extLst>
-          </p:cNvPr>
-          <p:cNvPicPr>
-            <a:picLocks noChangeAspect="1"/>
-          </p:cNvPicPr>
-          <p:nvPr/>
-        </p:nvPicPr>
-        <p:blipFill>
-          <a:blip r:embed="rId8">
-            <a:extLst>
-              <a:ext uri="{28A0092B-C50C-407E-A947-70E740481C1C}">
-                <a14:useLocalDpi xmlns:a14="http://schemas.microsoft.com/office/drawing/2010/main" val="0"/>
-              </a:ext>
-            </a:extLst>
-          </a:blip>
-          <a:stretch>
-            <a:fillRect/>
-          </a:stretch>
-        </p:blipFill>
-        <p:spPr>
-          <a:xfrm>
-            <a:off x="7841150" y="4600537"/>
-            <a:ext cx="3847692" cy="1490981"/>
-          </a:xfrm>
-          <a:prstGeom prst="rect">
-            <a:avLst/>
-          </a:prstGeom>
-        </p:spPr>
-      </p:pic>
-      <p:pic>
-        <p:nvPicPr>
-          <p:cNvPr id="5" name="Picture 4" descr="Blue text on a black background&#10;&#10;AI-generated content may be incorrect.">
-            <a:extLst>
-              <a:ext uri="{FF2B5EF4-FFF2-40B4-BE49-F238E27FC236}">
-                <a16:creationId xmlns:a16="http://schemas.microsoft.com/office/drawing/2014/main" id="{3ADAA09A-0E12-3D9A-BE61-816CB16C56C7}"/>
-              </a:ext>
-            </a:extLst>
-          </p:cNvPr>
-          <p:cNvPicPr>
-            <a:picLocks noChangeAspect="1"/>
-          </p:cNvPicPr>
-          <p:nvPr/>
-        </p:nvPicPr>
-        <p:blipFill>
-          <a:blip r:embed="rId9">
-            <a:extLst>
-              <a:ext uri="{28A0092B-C50C-407E-A947-70E740481C1C}">
-                <a14:useLocalDpi xmlns:a14="http://schemas.microsoft.com/office/drawing/2010/main" val="0"/>
-              </a:ext>
-            </a:extLst>
-          </a:blip>
-          <a:stretch>
-            <a:fillRect/>
-          </a:stretch>
-        </p:blipFill>
-        <p:spPr>
-          <a:xfrm>
-            <a:off x="4475958" y="4988722"/>
-            <a:ext cx="2872728" cy="714610"/>
-          </a:xfrm>
-          <a:prstGeom prst="rect">
-            <a:avLst/>
-          </a:prstGeom>
-        </p:spPr>
-      </p:pic>
-      <p:pic>
-        <p:nvPicPr>
-          <p:cNvPr id="4" name="Picture 3" descr="A green and blue text&#10;&#10;AI-generated content may be incorrect.">
-            <a:extLst>
-              <a:ext uri="{FF2B5EF4-FFF2-40B4-BE49-F238E27FC236}">
-                <a16:creationId xmlns:a16="http://schemas.microsoft.com/office/drawing/2014/main" id="{70A533A1-31CE-F74E-B206-B071CB997488}"/>
-              </a:ext>
-            </a:extLst>
-          </p:cNvPr>
-          <p:cNvPicPr>
-            <a:picLocks noChangeAspect="1"/>
-          </p:cNvPicPr>
-          <p:nvPr/>
-        </p:nvPicPr>
-        <p:blipFill>
-          <a:blip r:embed="rId10">
-            <a:extLst>
-              <a:ext uri="{28A0092B-C50C-407E-A947-70E740481C1C}">
-                <a14:useLocalDpi xmlns:a14="http://schemas.microsoft.com/office/drawing/2010/main" val="0"/>
-              </a:ext>
-            </a:extLst>
-          </a:blip>
-          <a:stretch>
-            <a:fillRect/>
-          </a:stretch>
-        </p:blipFill>
-        <p:spPr>
-          <a:xfrm>
-            <a:off x="796505" y="4988720"/>
-            <a:ext cx="2868512" cy="714612"/>
-          </a:xfrm>
-          <a:prstGeom prst="rect">
-            <a:avLst/>
-          </a:prstGeom>
-        </p:spPr>
-      </p:pic>
     </p:spTree>
     <p:extLst>
       <p:ext uri="{BB962C8B-B14F-4D97-AF65-F5344CB8AC3E}">

</xml_diff>

<commit_message>
update partners with sfits
</commit_message>
<xml_diff>
--- a/images/partners.pptx
+++ b/images/partners.pptx
@@ -261,7 +261,7 @@
           <a:p>
             <a:fld id="{19F83783-D132-4BFA-A7A1-CBFDC422E47E}" type="datetimeFigureOut">
               <a:rPr lang="en-CH" smtClean="0"/>
-              <a:t>03.07.2025</a:t>
+              <a:t>23.09.2025</a:t>
             </a:fld>
             <a:endParaRPr lang="en-CH"/>
           </a:p>
@@ -461,7 +461,7 @@
           <a:p>
             <a:fld id="{19F83783-D132-4BFA-A7A1-CBFDC422E47E}" type="datetimeFigureOut">
               <a:rPr lang="en-CH" smtClean="0"/>
-              <a:t>03.07.2025</a:t>
+              <a:t>23.09.2025</a:t>
             </a:fld>
             <a:endParaRPr lang="en-CH"/>
           </a:p>
@@ -671,7 +671,7 @@
           <a:p>
             <a:fld id="{19F83783-D132-4BFA-A7A1-CBFDC422E47E}" type="datetimeFigureOut">
               <a:rPr lang="en-CH" smtClean="0"/>
-              <a:t>03.07.2025</a:t>
+              <a:t>23.09.2025</a:t>
             </a:fld>
             <a:endParaRPr lang="en-CH"/>
           </a:p>
@@ -871,7 +871,7 @@
           <a:p>
             <a:fld id="{19F83783-D132-4BFA-A7A1-CBFDC422E47E}" type="datetimeFigureOut">
               <a:rPr lang="en-CH" smtClean="0"/>
-              <a:t>03.07.2025</a:t>
+              <a:t>23.09.2025</a:t>
             </a:fld>
             <a:endParaRPr lang="en-CH"/>
           </a:p>
@@ -1147,7 +1147,7 @@
           <a:p>
             <a:fld id="{19F83783-D132-4BFA-A7A1-CBFDC422E47E}" type="datetimeFigureOut">
               <a:rPr lang="en-CH" smtClean="0"/>
-              <a:t>03.07.2025</a:t>
+              <a:t>23.09.2025</a:t>
             </a:fld>
             <a:endParaRPr lang="en-CH"/>
           </a:p>
@@ -1415,7 +1415,7 @@
           <a:p>
             <a:fld id="{19F83783-D132-4BFA-A7A1-CBFDC422E47E}" type="datetimeFigureOut">
               <a:rPr lang="en-CH" smtClean="0"/>
-              <a:t>03.07.2025</a:t>
+              <a:t>23.09.2025</a:t>
             </a:fld>
             <a:endParaRPr lang="en-CH"/>
           </a:p>
@@ -1830,7 +1830,7 @@
           <a:p>
             <a:fld id="{19F83783-D132-4BFA-A7A1-CBFDC422E47E}" type="datetimeFigureOut">
               <a:rPr lang="en-CH" smtClean="0"/>
-              <a:t>03.07.2025</a:t>
+              <a:t>23.09.2025</a:t>
             </a:fld>
             <a:endParaRPr lang="en-CH"/>
           </a:p>
@@ -1972,7 +1972,7 @@
           <a:p>
             <a:fld id="{19F83783-D132-4BFA-A7A1-CBFDC422E47E}" type="datetimeFigureOut">
               <a:rPr lang="en-CH" smtClean="0"/>
-              <a:t>03.07.2025</a:t>
+              <a:t>23.09.2025</a:t>
             </a:fld>
             <a:endParaRPr lang="en-CH"/>
           </a:p>
@@ -2085,7 +2085,7 @@
           <a:p>
             <a:fld id="{19F83783-D132-4BFA-A7A1-CBFDC422E47E}" type="datetimeFigureOut">
               <a:rPr lang="en-CH" smtClean="0"/>
-              <a:t>03.07.2025</a:t>
+              <a:t>23.09.2025</a:t>
             </a:fld>
             <a:endParaRPr lang="en-CH"/>
           </a:p>
@@ -2398,7 +2398,7 @@
           <a:p>
             <a:fld id="{19F83783-D132-4BFA-A7A1-CBFDC422E47E}" type="datetimeFigureOut">
               <a:rPr lang="en-CH" smtClean="0"/>
-              <a:t>03.07.2025</a:t>
+              <a:t>23.09.2025</a:t>
             </a:fld>
             <a:endParaRPr lang="en-CH"/>
           </a:p>
@@ -2687,7 +2687,7 @@
           <a:p>
             <a:fld id="{19F83783-D132-4BFA-A7A1-CBFDC422E47E}" type="datetimeFigureOut">
               <a:rPr lang="en-CH" smtClean="0"/>
-              <a:t>03.07.2025</a:t>
+              <a:t>23.09.2025</a:t>
             </a:fld>
             <a:endParaRPr lang="en-CH"/>
           </a:p>
@@ -2930,7 +2930,7 @@
           <a:p>
             <a:fld id="{19F83783-D132-4BFA-A7A1-CBFDC422E47E}" type="datetimeFigureOut">
               <a:rPr lang="en-CH" smtClean="0"/>
-              <a:t>03.07.2025</a:t>
+              <a:t>23.09.2025</a:t>
             </a:fld>
             <a:endParaRPr lang="en-CH"/>
           </a:p>
@@ -3349,10 +3349,10 @@
       </p:grpSpPr>
       <p:grpSp>
         <p:nvGrpSpPr>
-          <p:cNvPr id="11" name="Group 10">
-            <a:extLst>
-              <a:ext uri="{FF2B5EF4-FFF2-40B4-BE49-F238E27FC236}">
-                <a16:creationId xmlns:a16="http://schemas.microsoft.com/office/drawing/2014/main" id="{6A20DDAE-A20C-E0AE-77CB-BB843E7A4E0F}"/>
+          <p:cNvPr id="12" name="Group 11">
+            <a:extLst>
+              <a:ext uri="{FF2B5EF4-FFF2-40B4-BE49-F238E27FC236}">
+                <a16:creationId xmlns:a16="http://schemas.microsoft.com/office/drawing/2014/main" id="{EB94B0DD-4162-04D1-B780-56FD501FB708}"/>
               </a:ext>
             </a:extLst>
           </p:cNvPr>
@@ -3367,243 +3367,222 @@
             <a:chExt cx="11066747" cy="5669039"/>
           </a:xfrm>
         </p:grpSpPr>
-        <p:grpSp>
-          <p:nvGrpSpPr>
-            <p:cNvPr id="18" name="Group 17">
+        <p:pic>
+          <p:nvPicPr>
+            <p:cNvPr id="6" name="Picture 5" descr="A black background with yellow letters and a black background&#10;&#10;Description automatically generated">
               <a:extLst>
                 <a:ext uri="{FF2B5EF4-FFF2-40B4-BE49-F238E27FC236}">
-                  <a16:creationId xmlns:a16="http://schemas.microsoft.com/office/drawing/2014/main" id="{0DC94438-0D97-1BAB-69A0-6881E49B1883}"/>
+                  <a16:creationId xmlns:a16="http://schemas.microsoft.com/office/drawing/2014/main" id="{ACCBA2E0-3184-E0E5-810D-0FB3DA40BAA6}"/>
                 </a:ext>
               </a:extLst>
             </p:cNvPr>
-            <p:cNvGrpSpPr/>
+            <p:cNvPicPr>
+              <a:picLocks noChangeAspect="1"/>
+            </p:cNvPicPr>
             <p:nvPr/>
-          </p:nvGrpSpPr>
-          <p:grpSpPr>
+          </p:nvPicPr>
+          <p:blipFill>
+            <a:blip r:embed="rId2">
+              <a:extLst>
+                <a:ext uri="{28A0092B-C50C-407E-A947-70E740481C1C}">
+                  <a14:useLocalDpi xmlns:a14="http://schemas.microsoft.com/office/drawing/2010/main" val="0"/>
+                </a:ext>
+              </a:extLst>
+            </a:blip>
+            <a:stretch>
+              <a:fillRect/>
+            </a:stretch>
+          </p:blipFill>
+          <p:spPr>
             <a:xfrm>
-              <a:off x="622095" y="422479"/>
-              <a:ext cx="10947809" cy="3670707"/>
-              <a:chOff x="586966" y="1705179"/>
-              <a:chExt cx="10947809" cy="3670707"/>
+              <a:off x="10031207" y="2591817"/>
+              <a:ext cx="1391011" cy="1674366"/>
             </a:xfrm>
-          </p:grpSpPr>
-          <p:pic>
-            <p:nvPicPr>
-              <p:cNvPr id="6" name="Picture 5" descr="A black background with yellow letters and a black background&#10;&#10;Description automatically generated">
-                <a:extLst>
-                  <a:ext uri="{FF2B5EF4-FFF2-40B4-BE49-F238E27FC236}">
-                    <a16:creationId xmlns:a16="http://schemas.microsoft.com/office/drawing/2014/main" id="{ACCBA2E0-3184-E0E5-810D-0FB3DA40BAA6}"/>
-                  </a:ext>
-                </a:extLst>
-              </p:cNvPr>
-              <p:cNvPicPr>
-                <a:picLocks noChangeAspect="1"/>
-              </p:cNvPicPr>
-              <p:nvPr/>
-            </p:nvPicPr>
-            <p:blipFill>
-              <a:blip r:embed="rId2">
-                <a:extLst>
-                  <a:ext uri="{28A0092B-C50C-407E-A947-70E740481C1C}">
-                    <a14:useLocalDpi xmlns:a14="http://schemas.microsoft.com/office/drawing/2010/main" val="0"/>
-                  </a:ext>
-                </a:extLst>
-              </a:blip>
-              <a:stretch>
-                <a:fillRect/>
-              </a:stretch>
-            </p:blipFill>
-            <p:spPr>
-              <a:xfrm>
-                <a:off x="5532718" y="3701520"/>
-                <a:ext cx="1391011" cy="1674366"/>
-              </a:xfrm>
-              <a:prstGeom prst="rect">
-                <a:avLst/>
-              </a:prstGeom>
-            </p:spPr>
-          </p:pic>
-          <p:pic>
-            <p:nvPicPr>
-              <p:cNvPr id="7" name="Picture 6" descr="A black text on a white background&#10;&#10;Description automatically generated">
-                <a:extLst>
-                  <a:ext uri="{FF2B5EF4-FFF2-40B4-BE49-F238E27FC236}">
-                    <a16:creationId xmlns:a16="http://schemas.microsoft.com/office/drawing/2014/main" id="{A5673BB9-CF7F-645D-D853-167A94AA539E}"/>
-                  </a:ext>
-                </a:extLst>
-              </p:cNvPr>
-              <p:cNvPicPr>
-                <a:picLocks noChangeAspect="1"/>
-              </p:cNvPicPr>
-              <p:nvPr/>
-            </p:nvPicPr>
-            <p:blipFill>
-              <a:blip r:embed="rId3">
-                <a:extLst>
-                  <a:ext uri="{28A0092B-C50C-407E-A947-70E740481C1C}">
-                    <a14:useLocalDpi xmlns:a14="http://schemas.microsoft.com/office/drawing/2010/main" val="0"/>
-                  </a:ext>
-                </a:extLst>
-              </a:blip>
-              <a:stretch>
-                <a:fillRect/>
-              </a:stretch>
-            </p:blipFill>
-            <p:spPr>
-              <a:xfrm>
-                <a:off x="586966" y="2168274"/>
-                <a:ext cx="3217333" cy="497584"/>
-              </a:xfrm>
-              <a:prstGeom prst="rect">
-                <a:avLst/>
-              </a:prstGeom>
-            </p:spPr>
-          </p:pic>
-          <p:pic>
-            <p:nvPicPr>
-              <p:cNvPr id="8" name="Picture 7" descr="A black and red text&#10;&#10;Description automatically generated">
-                <a:extLst>
-                  <a:ext uri="{FF2B5EF4-FFF2-40B4-BE49-F238E27FC236}">
-                    <a16:creationId xmlns:a16="http://schemas.microsoft.com/office/drawing/2014/main" id="{F20BE04F-F0B4-D103-2FCF-6F3870D03774}"/>
-                  </a:ext>
-                </a:extLst>
-              </p:cNvPr>
-              <p:cNvPicPr>
-                <a:picLocks noChangeAspect="1"/>
-              </p:cNvPicPr>
-              <p:nvPr/>
-            </p:nvPicPr>
-            <p:blipFill>
-              <a:blip r:embed="rId4">
-                <a:extLst>
-                  <a:ext uri="{28A0092B-C50C-407E-A947-70E740481C1C}">
-                    <a14:useLocalDpi xmlns:a14="http://schemas.microsoft.com/office/drawing/2010/main" val="0"/>
-                  </a:ext>
-                </a:extLst>
-              </a:blip>
-              <a:stretch>
-                <a:fillRect/>
-              </a:stretch>
-            </p:blipFill>
-            <p:spPr>
-              <a:xfrm>
-                <a:off x="8614049" y="4179375"/>
-                <a:ext cx="2764057" cy="718656"/>
-              </a:xfrm>
-              <a:prstGeom prst="rect">
-                <a:avLst/>
-              </a:prstGeom>
-            </p:spPr>
-          </p:pic>
-          <p:pic>
-            <p:nvPicPr>
-              <p:cNvPr id="9" name="Picture 8" descr="Blue letters and a white background&#10;&#10;Description automatically generated">
-                <a:extLst>
-                  <a:ext uri="{FF2B5EF4-FFF2-40B4-BE49-F238E27FC236}">
-                    <a16:creationId xmlns:a16="http://schemas.microsoft.com/office/drawing/2014/main" id="{9BDA4390-F62B-E6E7-CCFE-D4F4B082172D}"/>
-                  </a:ext>
-                </a:extLst>
-              </p:cNvPr>
-              <p:cNvPicPr>
-                <a:picLocks noChangeAspect="1"/>
-              </p:cNvPicPr>
-              <p:nvPr/>
-            </p:nvPicPr>
-            <p:blipFill>
-              <a:blip r:embed="rId5">
-                <a:extLst>
-                  <a:ext uri="{28A0092B-C50C-407E-A947-70E740481C1C}">
-                    <a14:useLocalDpi xmlns:a14="http://schemas.microsoft.com/office/drawing/2010/main" val="0"/>
-                  </a:ext>
-                </a:extLst>
-              </a:blip>
-              <a:stretch>
-                <a:fillRect/>
-              </a:stretch>
-            </p:blipFill>
-            <p:spPr>
-              <a:xfrm>
-                <a:off x="8457381" y="1987860"/>
-                <a:ext cx="3077394" cy="1028362"/>
-              </a:xfrm>
-              <a:prstGeom prst="rect">
-                <a:avLst/>
-              </a:prstGeom>
-            </p:spPr>
-          </p:pic>
-          <p:pic>
-            <p:nvPicPr>
-              <p:cNvPr id="15" name="Picture 14" descr="A black screen with white text&#10;&#10;Description automatically generated">
-                <a:extLst>
-                  <a:ext uri="{FF2B5EF4-FFF2-40B4-BE49-F238E27FC236}">
-                    <a16:creationId xmlns:a16="http://schemas.microsoft.com/office/drawing/2014/main" id="{4C600F53-3502-5374-83B6-EC388363129D}"/>
-                  </a:ext>
-                </a:extLst>
-              </p:cNvPr>
-              <p:cNvPicPr>
-                <a:picLocks noChangeAspect="1"/>
-              </p:cNvPicPr>
-              <p:nvPr/>
-            </p:nvPicPr>
-            <p:blipFill>
-              <a:blip r:embed="rId6">
-                <a:extLst>
-                  <a:ext uri="{28A0092B-C50C-407E-A947-70E740481C1C}">
-                    <a14:useLocalDpi xmlns:a14="http://schemas.microsoft.com/office/drawing/2010/main" val="0"/>
-                  </a:ext>
-                </a:extLst>
-              </a:blip>
-              <a:stretch>
-                <a:fillRect/>
-              </a:stretch>
-            </p:blipFill>
-            <p:spPr>
-              <a:xfrm>
-                <a:off x="946799" y="3775686"/>
-                <a:ext cx="2857500" cy="1600200"/>
-              </a:xfrm>
-              <a:prstGeom prst="rect">
-                <a:avLst/>
-              </a:prstGeom>
-            </p:spPr>
-          </p:pic>
-          <p:pic>
-            <p:nvPicPr>
-              <p:cNvPr id="17" name="Picture 16" descr="A white rectangular sign with black text&#10;&#10;Description automatically generated">
-                <a:extLst>
-                  <a:ext uri="{FF2B5EF4-FFF2-40B4-BE49-F238E27FC236}">
-                    <a16:creationId xmlns:a16="http://schemas.microsoft.com/office/drawing/2014/main" id="{E1FFDC59-AFFC-B253-E20A-73B7E806BF8C}"/>
-                  </a:ext>
-                </a:extLst>
-              </p:cNvPr>
-              <p:cNvPicPr>
-                <a:picLocks noChangeAspect="1"/>
-              </p:cNvPicPr>
-              <p:nvPr/>
-            </p:nvPicPr>
-            <p:blipFill>
-              <a:blip r:embed="rId7">
-                <a:extLst>
-                  <a:ext uri="{28A0092B-C50C-407E-A947-70E740481C1C}">
-                    <a14:useLocalDpi xmlns:a14="http://schemas.microsoft.com/office/drawing/2010/main" val="0"/>
-                  </a:ext>
-                </a:extLst>
-              </a:blip>
-              <a:stretch>
-                <a:fillRect/>
-              </a:stretch>
-            </p:blipFill>
-            <p:spPr>
-              <a:xfrm>
-                <a:off x="4492540" y="1705179"/>
-                <a:ext cx="3276600" cy="1419206"/>
-              </a:xfrm>
-              <a:prstGeom prst="rect">
-                <a:avLst/>
-              </a:prstGeom>
-            </p:spPr>
-          </p:pic>
-        </p:grpSp>
+            <a:prstGeom prst="rect">
+              <a:avLst/>
+            </a:prstGeom>
+          </p:spPr>
+        </p:pic>
+        <p:pic>
+          <p:nvPicPr>
+            <p:cNvPr id="7" name="Picture 6" descr="A black text on a white background&#10;&#10;Description automatically generated">
+              <a:extLst>
+                <a:ext uri="{FF2B5EF4-FFF2-40B4-BE49-F238E27FC236}">
+                  <a16:creationId xmlns:a16="http://schemas.microsoft.com/office/drawing/2014/main" id="{A5673BB9-CF7F-645D-D853-167A94AA539E}"/>
+                </a:ext>
+              </a:extLst>
+            </p:cNvPr>
+            <p:cNvPicPr>
+              <a:picLocks noChangeAspect="1"/>
+            </p:cNvPicPr>
+            <p:nvPr/>
+          </p:nvPicPr>
+          <p:blipFill>
+            <a:blip r:embed="rId3">
+              <a:extLst>
+                <a:ext uri="{28A0092B-C50C-407E-A947-70E740481C1C}">
+                  <a14:useLocalDpi xmlns:a14="http://schemas.microsoft.com/office/drawing/2010/main" val="0"/>
+                </a:ext>
+              </a:extLst>
+            </a:blip>
+            <a:stretch>
+              <a:fillRect/>
+            </a:stretch>
+          </p:blipFill>
+          <p:spPr>
+            <a:xfrm>
+              <a:off x="622095" y="885574"/>
+              <a:ext cx="3217333" cy="497584"/>
+            </a:xfrm>
+            <a:prstGeom prst="rect">
+              <a:avLst/>
+            </a:prstGeom>
+          </p:spPr>
+        </p:pic>
+        <p:pic>
+          <p:nvPicPr>
+            <p:cNvPr id="8" name="Picture 7" descr="A black and red text&#10;&#10;Description automatically generated">
+              <a:extLst>
+                <a:ext uri="{FF2B5EF4-FFF2-40B4-BE49-F238E27FC236}">
+                  <a16:creationId xmlns:a16="http://schemas.microsoft.com/office/drawing/2014/main" id="{F20BE04F-F0B4-D103-2FCF-6F3870D03774}"/>
+                </a:ext>
+              </a:extLst>
+            </p:cNvPr>
+            <p:cNvPicPr>
+              <a:picLocks noChangeAspect="1"/>
+            </p:cNvPicPr>
+            <p:nvPr/>
+          </p:nvPicPr>
+          <p:blipFill>
+            <a:blip r:embed="rId4">
+              <a:extLst>
+                <a:ext uri="{28A0092B-C50C-407E-A947-70E740481C1C}">
+                  <a14:useLocalDpi xmlns:a14="http://schemas.microsoft.com/office/drawing/2010/main" val="0"/>
+                </a:ext>
+              </a:extLst>
+            </a:blip>
+            <a:stretch>
+              <a:fillRect/>
+            </a:stretch>
+          </p:blipFill>
+          <p:spPr>
+            <a:xfrm>
+              <a:off x="6583312" y="2933758"/>
+              <a:ext cx="2764057" cy="718656"/>
+            </a:xfrm>
+            <a:prstGeom prst="rect">
+              <a:avLst/>
+            </a:prstGeom>
+          </p:spPr>
+        </p:pic>
+        <p:pic>
+          <p:nvPicPr>
+            <p:cNvPr id="9" name="Picture 8" descr="Blue letters and a white background&#10;&#10;Description automatically generated">
+              <a:extLst>
+                <a:ext uri="{FF2B5EF4-FFF2-40B4-BE49-F238E27FC236}">
+                  <a16:creationId xmlns:a16="http://schemas.microsoft.com/office/drawing/2014/main" id="{9BDA4390-F62B-E6E7-CCFE-D4F4B082172D}"/>
+                </a:ext>
+              </a:extLst>
+            </p:cNvPr>
+            <p:cNvPicPr>
+              <a:picLocks noChangeAspect="1"/>
+            </p:cNvPicPr>
+            <p:nvPr/>
+          </p:nvPicPr>
+          <p:blipFill>
+            <a:blip r:embed="rId5">
+              <a:extLst>
+                <a:ext uri="{28A0092B-C50C-407E-A947-70E740481C1C}">
+                  <a14:useLocalDpi xmlns:a14="http://schemas.microsoft.com/office/drawing/2010/main" val="0"/>
+                </a:ext>
+              </a:extLst>
+            </a:blip>
+            <a:stretch>
+              <a:fillRect/>
+            </a:stretch>
+          </p:blipFill>
+          <p:spPr>
+            <a:xfrm>
+              <a:off x="8492510" y="705160"/>
+              <a:ext cx="3077394" cy="1028362"/>
+            </a:xfrm>
+            <a:prstGeom prst="rect">
+              <a:avLst/>
+            </a:prstGeom>
+          </p:spPr>
+        </p:pic>
+        <p:pic>
+          <p:nvPicPr>
+            <p:cNvPr id="15" name="Picture 14" descr="A black screen with white text&#10;&#10;Description automatically generated">
+              <a:extLst>
+                <a:ext uri="{FF2B5EF4-FFF2-40B4-BE49-F238E27FC236}">
+                  <a16:creationId xmlns:a16="http://schemas.microsoft.com/office/drawing/2014/main" id="{4C600F53-3502-5374-83B6-EC388363129D}"/>
+                </a:ext>
+              </a:extLst>
+            </p:cNvPr>
+            <p:cNvPicPr>
+              <a:picLocks noChangeAspect="1"/>
+            </p:cNvPicPr>
+            <p:nvPr/>
+          </p:nvPicPr>
+          <p:blipFill>
+            <a:blip r:embed="rId6">
+              <a:extLst>
+                <a:ext uri="{28A0092B-C50C-407E-A947-70E740481C1C}">
+                  <a14:useLocalDpi xmlns:a14="http://schemas.microsoft.com/office/drawing/2010/main" val="0"/>
+                </a:ext>
+              </a:extLst>
+            </a:blip>
+            <a:stretch>
+              <a:fillRect/>
+            </a:stretch>
+          </p:blipFill>
+          <p:spPr>
+            <a:xfrm>
+              <a:off x="981928" y="2492986"/>
+              <a:ext cx="2857500" cy="1600200"/>
+            </a:xfrm>
+            <a:prstGeom prst="rect">
+              <a:avLst/>
+            </a:prstGeom>
+          </p:spPr>
+        </p:pic>
+        <p:pic>
+          <p:nvPicPr>
+            <p:cNvPr id="17" name="Picture 16" descr="A white rectangular sign with black text&#10;&#10;Description automatically generated">
+              <a:extLst>
+                <a:ext uri="{FF2B5EF4-FFF2-40B4-BE49-F238E27FC236}">
+                  <a16:creationId xmlns:a16="http://schemas.microsoft.com/office/drawing/2014/main" id="{E1FFDC59-AFFC-B253-E20A-73B7E806BF8C}"/>
+                </a:ext>
+              </a:extLst>
+            </p:cNvPr>
+            <p:cNvPicPr>
+              <a:picLocks noChangeAspect="1"/>
+            </p:cNvPicPr>
+            <p:nvPr/>
+          </p:nvPicPr>
+          <p:blipFill>
+            <a:blip r:embed="rId7">
+              <a:extLst>
+                <a:ext uri="{28A0092B-C50C-407E-A947-70E740481C1C}">
+                  <a14:useLocalDpi xmlns:a14="http://schemas.microsoft.com/office/drawing/2010/main" val="0"/>
+                </a:ext>
+              </a:extLst>
+            </a:blip>
+            <a:stretch>
+              <a:fillRect/>
+            </a:stretch>
+          </p:blipFill>
+          <p:spPr>
+            <a:xfrm>
+              <a:off x="4527669" y="422479"/>
+              <a:ext cx="3276600" cy="1419206"/>
+            </a:xfrm>
+            <a:prstGeom prst="rect">
+              <a:avLst/>
+            </a:prstGeom>
+          </p:spPr>
+        </p:pic>
         <p:pic>
           <p:nvPicPr>
             <p:cNvPr id="3" name="Picture 2" descr="A purple text on a black background&#10;&#10;AI-generated content may be incorrect.">
@@ -3706,6 +3685,43 @@
             <a:xfrm>
               <a:off x="796505" y="4988720"/>
               <a:ext cx="2868512" cy="714612"/>
+            </a:xfrm>
+            <a:prstGeom prst="rect">
+              <a:avLst/>
+            </a:prstGeom>
+          </p:spPr>
+        </p:pic>
+        <p:pic>
+          <p:nvPicPr>
+            <p:cNvPr id="10" name="Picture 9" descr="A logo for a company&#10;&#10;AI-generated content may be incorrect.">
+              <a:extLst>
+                <a:ext uri="{FF2B5EF4-FFF2-40B4-BE49-F238E27FC236}">
+                  <a16:creationId xmlns:a16="http://schemas.microsoft.com/office/drawing/2014/main" id="{0B1E68C5-4AA9-FD13-5260-6A4D05E7D06D}"/>
+                </a:ext>
+              </a:extLst>
+            </p:cNvPr>
+            <p:cNvPicPr>
+              <a:picLocks noChangeAspect="1"/>
+            </p:cNvPicPr>
+            <p:nvPr/>
+          </p:nvPicPr>
+          <p:blipFill>
+            <a:blip r:embed="rId11">
+              <a:extLst>
+                <a:ext uri="{28A0092B-C50C-407E-A947-70E740481C1C}">
+                  <a14:useLocalDpi xmlns:a14="http://schemas.microsoft.com/office/drawing/2010/main" val="0"/>
+                </a:ext>
+              </a:extLst>
+            </a:blip>
+            <a:srcRect l="14000" t="29333" r="15333" b="32568"/>
+            <a:stretch>
+              <a:fillRect/>
+            </a:stretch>
+          </p:blipFill>
+          <p:spPr>
+            <a:xfrm>
+              <a:off x="3839428" y="2592280"/>
+              <a:ext cx="2370667" cy="1278125"/>
             </a:xfrm>
             <a:prstGeom prst="rect">
               <a:avLst/>

</xml_diff>